<commit_message>
Added EverithingConverter. Added WatiN slides
</commit_message>
<xml_diff>
--- a/posidelki-16/presentation/Posidelki-16 - Specflow.pptx
+++ b/posidelki-16/presentation/Posidelki-16 - Specflow.pptx
@@ -5,10 +5,10 @@
     <p:sldMasterId id="2147483648" r:id="rId1"/>
   </p:sldMasterIdLst>
   <p:notesMasterIdLst>
-    <p:notesMasterId r:id="rId56"/>
+    <p:notesMasterId r:id="rId62"/>
   </p:notesMasterIdLst>
   <p:handoutMasterIdLst>
-    <p:handoutMasterId r:id="rId57"/>
+    <p:handoutMasterId r:id="rId63"/>
   </p:handoutMasterIdLst>
   <p:sldIdLst>
     <p:sldId id="256" r:id="rId2"/>
@@ -65,6 +65,12 @@
     <p:sldId id="307" r:id="rId53"/>
     <p:sldId id="308" r:id="rId54"/>
     <p:sldId id="309" r:id="rId55"/>
+    <p:sldId id="310" r:id="rId56"/>
+    <p:sldId id="311" r:id="rId57"/>
+    <p:sldId id="312" r:id="rId58"/>
+    <p:sldId id="313" r:id="rId59"/>
+    <p:sldId id="314" r:id="rId60"/>
+    <p:sldId id="315" r:id="rId61"/>
   </p:sldIdLst>
   <p:sldSz cx="9144000" cy="6858000" type="screen4x3"/>
   <p:notesSz cx="6858000" cy="9144000"/>
@@ -248,7 +254,7 @@
           <a:p>
             <a:fld id="{8FDEA034-4DFD-4B36-AAF8-74A374848EAA}" type="datetimeFigureOut">
               <a:rPr lang="ru-RU" smtClean="0"/>
-              <a:t>13.05.2012</a:t>
+              <a:t>16.05.2012</a:t>
             </a:fld>
             <a:endParaRPr lang="ru-RU"/>
           </a:p>
@@ -413,7 +419,7 @@
           <a:p>
             <a:fld id="{7C211E28-BFF5-4624-AEC8-C235E77A5E0A}" type="datetimeFigureOut">
               <a:rPr lang="ru-RU" smtClean="0"/>
-              <a:t>13.05.2012</a:t>
+              <a:t>16.05.2012</a:t>
             </a:fld>
             <a:endParaRPr lang="ru-RU"/>
           </a:p>
@@ -880,7 +886,7 @@
           <a:p>
             <a:fld id="{6431E467-7B4B-44F4-AA54-FA24E69C3307}" type="datetime1">
               <a:rPr lang="ru-RU" smtClean="0"/>
-              <a:t>13.05.2012</a:t>
+              <a:t>16.05.2012</a:t>
             </a:fld>
             <a:endParaRPr lang="ru-RU"/>
           </a:p>
@@ -1433,7 +1439,7 @@
           <a:p>
             <a:fld id="{1127AA14-747C-45EC-B625-E2F2D438532A}" type="datetime1">
               <a:rPr lang="ru-RU" smtClean="0"/>
-              <a:t>13.05.2012</a:t>
+              <a:t>16.05.2012</a:t>
             </a:fld>
             <a:endParaRPr lang="ru-RU"/>
           </a:p>
@@ -1613,7 +1619,7 @@
           <a:p>
             <a:fld id="{E323735B-7AD0-48B8-B773-D3B42DEF9F84}" type="datetime1">
               <a:rPr lang="ru-RU" smtClean="0"/>
-              <a:t>13.05.2012</a:t>
+              <a:t>16.05.2012</a:t>
             </a:fld>
             <a:endParaRPr lang="ru-RU"/>
           </a:p>
@@ -1808,7 +1814,7 @@
           <a:p>
             <a:fld id="{792C099D-51BE-4419-9E83-34BA2D03BF5D}" type="datetime1">
               <a:rPr lang="ru-RU" smtClean="0"/>
-              <a:t>13.05.2012</a:t>
+              <a:t>16.05.2012</a:t>
             </a:fld>
             <a:endParaRPr lang="ru-RU" dirty="0"/>
           </a:p>
@@ -2299,7 +2305,7 @@
           <a:p>
             <a:fld id="{90BE21EE-2753-4401-9FBF-FAB9B2CFD491}" type="datetime1">
               <a:rPr lang="ru-RU" smtClean="0"/>
-              <a:t>13.05.2012</a:t>
+              <a:t>16.05.2012</a:t>
             </a:fld>
             <a:endParaRPr lang="ru-RU"/>
           </a:p>
@@ -2839,7 +2845,7 @@
           <a:p>
             <a:fld id="{5EC174C2-BE07-4F85-906B-D46DCF250609}" type="datetime1">
               <a:rPr lang="ru-RU" smtClean="0"/>
-              <a:t>13.05.2012</a:t>
+              <a:t>16.05.2012</a:t>
             </a:fld>
             <a:endParaRPr lang="ru-RU"/>
           </a:p>
@@ -3623,7 +3629,7 @@
           <a:p>
             <a:fld id="{4E47D2DE-CDCC-4F4A-80F4-176DC7D2D21D}" type="datetime1">
               <a:rPr lang="ru-RU" smtClean="0"/>
-              <a:t>13.05.2012</a:t>
+              <a:t>16.05.2012</a:t>
             </a:fld>
             <a:endParaRPr lang="ru-RU"/>
           </a:p>
@@ -4109,7 +4115,7 @@
           <a:p>
             <a:fld id="{39EAF782-CB1A-4D8D-A85D-8253C541460D}" type="datetime1">
               <a:rPr lang="ru-RU" smtClean="0"/>
-              <a:t>13.05.2012</a:t>
+              <a:t>16.05.2012</a:t>
             </a:fld>
             <a:endParaRPr lang="ru-RU"/>
           </a:p>
@@ -4543,7 +4549,7 @@
           <a:p>
             <a:fld id="{455041D8-EF48-488C-91E7-641CD4E6A17F}" type="datetime1">
               <a:rPr lang="ru-RU" smtClean="0"/>
-              <a:t>13.05.2012</a:t>
+              <a:t>16.05.2012</a:t>
             </a:fld>
             <a:endParaRPr lang="ru-RU"/>
           </a:p>
@@ -5109,7 +5115,7 @@
           <a:p>
             <a:fld id="{44D5BAAC-F5F7-4355-B255-0395FB421FF1}" type="datetime1">
               <a:rPr lang="ru-RU" smtClean="0"/>
-              <a:t>13.05.2012</a:t>
+              <a:t>16.05.2012</a:t>
             </a:fld>
             <a:endParaRPr lang="ru-RU"/>
           </a:p>
@@ -5709,7 +5715,7 @@
           <a:p>
             <a:fld id="{B2249B7E-3121-40B8-8C53-75270044E49B}" type="datetime1">
               <a:rPr lang="ru-RU" smtClean="0"/>
-              <a:t>13.05.2012</a:t>
+              <a:t>16.05.2012</a:t>
             </a:fld>
             <a:endParaRPr lang="ru-RU"/>
           </a:p>
@@ -6203,7 +6209,7 @@
           <a:p>
             <a:fld id="{BFE23545-B7F4-44A5-ABCF-E34F9135435C}" type="datetime1">
               <a:rPr lang="ru-RU" smtClean="0"/>
-              <a:t>13.05.2012</a:t>
+              <a:t>16.05.2012</a:t>
             </a:fld>
             <a:endParaRPr lang="ru-RU" dirty="0"/>
           </a:p>
@@ -19104,7 +19110,15 @@
           <a:p>
             <a:r>
               <a:rPr lang="ru-RU" dirty="0" smtClean="0"/>
-              <a:t>Как?</a:t>
+              <a:t>Как</a:t>
+            </a:r>
+            <a:r>
+              <a:rPr lang="en-US" dirty="0" smtClean="0"/>
+              <a:t> </a:t>
+            </a:r>
+            <a:r>
+              <a:rPr lang="ru-RU" dirty="0" smtClean="0"/>
+              <a:t>вылечить?</a:t>
             </a:r>
             <a:endParaRPr lang="ru-RU" dirty="0"/>
           </a:p>
@@ -19410,10 +19424,1064 @@
           </a:p>
         </p:txBody>
       </p:sp>
+      <p:pic>
+        <p:nvPicPr>
+          <p:cNvPr id="1026" name="Picture 2"/>
+          <p:cNvPicPr>
+            <a:picLocks noChangeAspect="1" noChangeArrowheads="1"/>
+          </p:cNvPicPr>
+          <p:nvPr/>
+        </p:nvPicPr>
+        <p:blipFill>
+          <a:blip r:embed="rId2">
+            <a:extLst>
+              <a:ext uri="{28A0092B-C50C-407E-A947-70E740481C1C}">
+                <a14:useLocalDpi xmlns:a14="http://schemas.microsoft.com/office/drawing/2010/main" val="0"/>
+              </a:ext>
+            </a:extLst>
+          </a:blip>
+          <a:srcRect/>
+          <a:stretch>
+            <a:fillRect/>
+          </a:stretch>
+        </p:blipFill>
+        <p:spPr bwMode="auto">
+          <a:xfrm>
+            <a:off x="347663" y="2060848"/>
+            <a:ext cx="8448675" cy="3990975"/>
+          </a:xfrm>
+          <a:prstGeom prst="rect">
+            <a:avLst/>
+          </a:prstGeom>
+          <a:noFill/>
+          <a:ln>
+            <a:noFill/>
+          </a:ln>
+          <a:effectLst/>
+          <a:extLst>
+            <a:ext uri="{909E8E84-426E-40DD-AFC4-6F175D3DCCD1}">
+              <a14:hiddenFill xmlns:a14="http://schemas.microsoft.com/office/drawing/2010/main">
+                <a:solidFill>
+                  <a:schemeClr val="accent1"/>
+                </a:solidFill>
+              </a14:hiddenFill>
+            </a:ext>
+            <a:ext uri="{91240B29-F687-4F45-9708-019B960494DF}">
+              <a14:hiddenLine xmlns:a14="http://schemas.microsoft.com/office/drawing/2010/main" w="9525">
+                <a:solidFill>
+                  <a:schemeClr val="tx1"/>
+                </a:solidFill>
+                <a:miter lim="800000"/>
+                <a:headEnd/>
+                <a:tailEnd/>
+              </a14:hiddenLine>
+            </a:ext>
+            <a:ext uri="{AF507438-7753-43E0-B8FC-AC1667EBCBE1}">
+              <a14:hiddenEffects xmlns:a14="http://schemas.microsoft.com/office/drawing/2010/main">
+                <a:effectLst>
+                  <a:outerShdw dist="35921" dir="2700000" algn="ctr" rotWithShape="0">
+                    <a:schemeClr val="bg2"/>
+                  </a:outerShdw>
+                </a:effectLst>
+              </a14:hiddenEffects>
+            </a:ext>
+          </a:extLst>
+        </p:spPr>
+      </p:pic>
     </p:spTree>
     <p:extLst>
       <p:ext uri="{BB962C8B-B14F-4D97-AF65-F5344CB8AC3E}">
         <p14:creationId xmlns:p14="http://schemas.microsoft.com/office/powerpoint/2010/main" val="4130835249"/>
+      </p:ext>
+    </p:extLst>
+  </p:cSld>
+  <p:clrMapOvr>
+    <a:masterClrMapping/>
+  </p:clrMapOvr>
+  <p:timing>
+    <p:tnLst>
+      <p:par>
+        <p:cTn id="1" dur="indefinite" restart="never" nodeType="tmRoot"/>
+      </p:par>
+    </p:tnLst>
+  </p:timing>
+</p:sld>
+</file>
+
+<file path=ppt/slides/slide55.xml><?xml version="1.0" encoding="utf-8"?>
+<p:sld xmlns:a="http://schemas.openxmlformats.org/drawingml/2006/main" xmlns:r="http://schemas.openxmlformats.org/officeDocument/2006/relationships" xmlns:p="http://schemas.openxmlformats.org/presentationml/2006/main">
+  <p:cSld>
+    <p:spTree>
+      <p:nvGrpSpPr>
+        <p:cNvPr id="1" name=""/>
+        <p:cNvGrpSpPr/>
+        <p:nvPr/>
+      </p:nvGrpSpPr>
+      <p:grpSpPr>
+        <a:xfrm>
+          <a:off x="0" y="0"/>
+          <a:ext cx="0" cy="0"/>
+          <a:chOff x="0" y="0"/>
+          <a:chExt cx="0" cy="0"/>
+        </a:xfrm>
+      </p:grpSpPr>
+      <p:sp>
+        <p:nvSpPr>
+          <p:cNvPr id="2" name="Заголовок 1"/>
+          <p:cNvSpPr>
+            <a:spLocks noGrp="1"/>
+          </p:cNvSpPr>
+          <p:nvPr>
+            <p:ph type="title"/>
+          </p:nvPr>
+        </p:nvSpPr>
+        <p:spPr/>
+        <p:txBody>
+          <a:bodyPr/>
+          <a:lstStyle/>
+          <a:p>
+            <a:r>
+              <a:rPr lang="ru-RU" dirty="0" smtClean="0"/>
+              <a:t>Набор текста</a:t>
+            </a:r>
+            <a:endParaRPr lang="ru-RU" dirty="0"/>
+          </a:p>
+        </p:txBody>
+      </p:sp>
+      <p:sp>
+        <p:nvSpPr>
+          <p:cNvPr id="3" name="Номер слайда 2"/>
+          <p:cNvSpPr>
+            <a:spLocks noGrp="1"/>
+          </p:cNvSpPr>
+          <p:nvPr>
+            <p:ph type="sldNum" sz="quarter" idx="12"/>
+          </p:nvPr>
+        </p:nvSpPr>
+        <p:spPr/>
+        <p:txBody>
+          <a:bodyPr/>
+          <a:lstStyle/>
+          <a:p>
+            <a:fld id="{856B8CD2-A8B3-41B0-B02C-5B2C28F6DA9C}" type="slidenum">
+              <a:rPr lang="ru-RU" smtClean="0"/>
+              <a:t>55</a:t>
+            </a:fld>
+            <a:endParaRPr lang="ru-RU"/>
+          </a:p>
+        </p:txBody>
+      </p:sp>
+      <p:pic>
+        <p:nvPicPr>
+          <p:cNvPr id="2051" name="Picture 3"/>
+          <p:cNvPicPr>
+            <a:picLocks noChangeAspect="1" noChangeArrowheads="1"/>
+          </p:cNvPicPr>
+          <p:nvPr/>
+        </p:nvPicPr>
+        <p:blipFill>
+          <a:blip r:embed="rId2">
+            <a:extLst>
+              <a:ext uri="{28A0092B-C50C-407E-A947-70E740481C1C}">
+                <a14:useLocalDpi xmlns:a14="http://schemas.microsoft.com/office/drawing/2010/main" val="0"/>
+              </a:ext>
+            </a:extLst>
+          </a:blip>
+          <a:srcRect/>
+          <a:stretch>
+            <a:fillRect/>
+          </a:stretch>
+        </p:blipFill>
+        <p:spPr bwMode="auto">
+          <a:xfrm>
+            <a:off x="539552" y="1268760"/>
+            <a:ext cx="7848872" cy="5185610"/>
+          </a:xfrm>
+          <a:prstGeom prst="rect">
+            <a:avLst/>
+          </a:prstGeom>
+          <a:noFill/>
+          <a:ln>
+            <a:noFill/>
+          </a:ln>
+          <a:effectLst/>
+          <a:extLst>
+            <a:ext uri="{909E8E84-426E-40DD-AFC4-6F175D3DCCD1}">
+              <a14:hiddenFill xmlns:a14="http://schemas.microsoft.com/office/drawing/2010/main">
+                <a:solidFill>
+                  <a:schemeClr val="accent1"/>
+                </a:solidFill>
+              </a14:hiddenFill>
+            </a:ext>
+            <a:ext uri="{91240B29-F687-4F45-9708-019B960494DF}">
+              <a14:hiddenLine xmlns:a14="http://schemas.microsoft.com/office/drawing/2010/main" w="9525">
+                <a:solidFill>
+                  <a:schemeClr val="tx1"/>
+                </a:solidFill>
+                <a:miter lim="800000"/>
+                <a:headEnd/>
+                <a:tailEnd/>
+              </a14:hiddenLine>
+            </a:ext>
+            <a:ext uri="{AF507438-7753-43E0-B8FC-AC1667EBCBE1}">
+              <a14:hiddenEffects xmlns:a14="http://schemas.microsoft.com/office/drawing/2010/main">
+                <a:effectLst>
+                  <a:outerShdw dist="35921" dir="2700000" algn="ctr" rotWithShape="0">
+                    <a:schemeClr val="bg2"/>
+                  </a:outerShdw>
+                </a:effectLst>
+              </a14:hiddenEffects>
+            </a:ext>
+          </a:extLst>
+        </p:spPr>
+      </p:pic>
+      <p:sp>
+        <p:nvSpPr>
+          <p:cNvPr id="6" name="TextBox 5"/>
+          <p:cNvSpPr txBox="1"/>
+          <p:nvPr/>
+        </p:nvSpPr>
+        <p:spPr>
+          <a:xfrm>
+            <a:off x="3491880" y="3429000"/>
+            <a:ext cx="184731" cy="369332"/>
+          </a:xfrm>
+          <a:prstGeom prst="rect">
+            <a:avLst/>
+          </a:prstGeom>
+          <a:noFill/>
+        </p:spPr>
+        <p:txBody>
+          <a:bodyPr wrap="none" rtlCol="0">
+            <a:spAutoFit/>
+          </a:bodyPr>
+          <a:lstStyle/>
+          <a:p>
+            <a:endParaRPr lang="ru-RU" dirty="0"/>
+          </a:p>
+        </p:txBody>
+      </p:sp>
+      <p:pic>
+        <p:nvPicPr>
+          <p:cNvPr id="2052" name="Picture 4"/>
+          <p:cNvPicPr>
+            <a:picLocks noChangeAspect="1" noChangeArrowheads="1"/>
+          </p:cNvPicPr>
+          <p:nvPr/>
+        </p:nvPicPr>
+        <p:blipFill>
+          <a:blip r:embed="rId3">
+            <a:extLst>
+              <a:ext uri="{28A0092B-C50C-407E-A947-70E740481C1C}">
+                <a14:useLocalDpi xmlns:a14="http://schemas.microsoft.com/office/drawing/2010/main" val="0"/>
+              </a:ext>
+            </a:extLst>
+          </a:blip>
+          <a:srcRect/>
+          <a:stretch>
+            <a:fillRect/>
+          </a:stretch>
+        </p:blipFill>
+        <p:spPr bwMode="auto">
+          <a:xfrm>
+            <a:off x="1344550" y="2636912"/>
+            <a:ext cx="6755842" cy="3620306"/>
+          </a:xfrm>
+          <a:prstGeom prst="rect">
+            <a:avLst/>
+          </a:prstGeom>
+          <a:noFill/>
+          <a:ln>
+            <a:noFill/>
+          </a:ln>
+          <a:effectLst>
+            <a:glow rad="101600">
+              <a:schemeClr val="accent4">
+                <a:satMod val="175000"/>
+                <a:alpha val="40000"/>
+              </a:schemeClr>
+            </a:glow>
+            <a:outerShdw blurRad="50800" dist="38100" dir="5400000" algn="t" rotWithShape="0">
+              <a:prstClr val="black">
+                <a:alpha val="40000"/>
+              </a:prstClr>
+            </a:outerShdw>
+          </a:effectLst>
+          <a:extLst>
+            <a:ext uri="{909E8E84-426E-40DD-AFC4-6F175D3DCCD1}">
+              <a14:hiddenFill xmlns:a14="http://schemas.microsoft.com/office/drawing/2010/main">
+                <a:solidFill>
+                  <a:schemeClr val="accent1"/>
+                </a:solidFill>
+              </a14:hiddenFill>
+            </a:ext>
+            <a:ext uri="{91240B29-F687-4F45-9708-019B960494DF}">
+              <a14:hiddenLine xmlns:a14="http://schemas.microsoft.com/office/drawing/2010/main" w="9525">
+                <a:solidFill>
+                  <a:schemeClr val="tx1"/>
+                </a:solidFill>
+                <a:miter lim="800000"/>
+                <a:headEnd/>
+                <a:tailEnd/>
+              </a14:hiddenLine>
+            </a:ext>
+          </a:extLst>
+        </p:spPr>
+      </p:pic>
+    </p:spTree>
+    <p:extLst>
+      <p:ext uri="{BB962C8B-B14F-4D97-AF65-F5344CB8AC3E}">
+        <p14:creationId xmlns:p14="http://schemas.microsoft.com/office/powerpoint/2010/main" val="1790608777"/>
+      </p:ext>
+    </p:extLst>
+  </p:cSld>
+  <p:clrMapOvr>
+    <a:masterClrMapping/>
+  </p:clrMapOvr>
+  <p:timing>
+    <p:tnLst>
+      <p:par>
+        <p:cTn id="1" dur="indefinite" restart="never" nodeType="tmRoot"/>
+      </p:par>
+    </p:tnLst>
+  </p:timing>
+</p:sld>
+</file>
+
+<file path=ppt/slides/slide56.xml><?xml version="1.0" encoding="utf-8"?>
+<p:sld xmlns:a="http://schemas.openxmlformats.org/drawingml/2006/main" xmlns:r="http://schemas.openxmlformats.org/officeDocument/2006/relationships" xmlns:p="http://schemas.openxmlformats.org/presentationml/2006/main">
+  <p:cSld>
+    <p:spTree>
+      <p:nvGrpSpPr>
+        <p:cNvPr id="1" name=""/>
+        <p:cNvGrpSpPr/>
+        <p:nvPr/>
+      </p:nvGrpSpPr>
+      <p:grpSpPr>
+        <a:xfrm>
+          <a:off x="0" y="0"/>
+          <a:ext cx="0" cy="0"/>
+          <a:chOff x="0" y="0"/>
+          <a:chExt cx="0" cy="0"/>
+        </a:xfrm>
+      </p:grpSpPr>
+      <p:sp>
+        <p:nvSpPr>
+          <p:cNvPr id="2" name="Заголовок 1"/>
+          <p:cNvSpPr>
+            <a:spLocks noGrp="1"/>
+          </p:cNvSpPr>
+          <p:nvPr>
+            <p:ph type="title"/>
+          </p:nvPr>
+        </p:nvSpPr>
+        <p:spPr/>
+        <p:txBody>
+          <a:bodyPr/>
+          <a:lstStyle/>
+          <a:p>
+            <a:r>
+              <a:rPr lang="ru-RU" dirty="0" smtClean="0"/>
+              <a:t>Ожидание элемента</a:t>
+            </a:r>
+            <a:endParaRPr lang="ru-RU" dirty="0"/>
+          </a:p>
+        </p:txBody>
+      </p:sp>
+      <p:sp>
+        <p:nvSpPr>
+          <p:cNvPr id="3" name="Номер слайда 2"/>
+          <p:cNvSpPr>
+            <a:spLocks noGrp="1"/>
+          </p:cNvSpPr>
+          <p:nvPr>
+            <p:ph type="sldNum" sz="quarter" idx="12"/>
+          </p:nvPr>
+        </p:nvSpPr>
+        <p:spPr/>
+        <p:txBody>
+          <a:bodyPr/>
+          <a:lstStyle/>
+          <a:p>
+            <a:fld id="{856B8CD2-A8B3-41B0-B02C-5B2C28F6DA9C}" type="slidenum">
+              <a:rPr lang="ru-RU" smtClean="0"/>
+              <a:t>56</a:t>
+            </a:fld>
+            <a:endParaRPr lang="ru-RU"/>
+          </a:p>
+        </p:txBody>
+      </p:sp>
+      <p:pic>
+        <p:nvPicPr>
+          <p:cNvPr id="3074" name="Picture 2"/>
+          <p:cNvPicPr>
+            <a:picLocks noChangeAspect="1" noChangeArrowheads="1"/>
+          </p:cNvPicPr>
+          <p:nvPr/>
+        </p:nvPicPr>
+        <p:blipFill>
+          <a:blip r:embed="rId2">
+            <a:extLst>
+              <a:ext uri="{28A0092B-C50C-407E-A947-70E740481C1C}">
+                <a14:useLocalDpi xmlns:a14="http://schemas.microsoft.com/office/drawing/2010/main" val="0"/>
+              </a:ext>
+            </a:extLst>
+          </a:blip>
+          <a:srcRect/>
+          <a:stretch>
+            <a:fillRect/>
+          </a:stretch>
+        </p:blipFill>
+        <p:spPr bwMode="auto">
+          <a:xfrm>
+            <a:off x="231245" y="1412775"/>
+            <a:ext cx="7008813" cy="2276475"/>
+          </a:xfrm>
+          <a:prstGeom prst="rect">
+            <a:avLst/>
+          </a:prstGeom>
+          <a:noFill/>
+          <a:ln>
+            <a:noFill/>
+          </a:ln>
+          <a:effectLst/>
+          <a:extLst>
+            <a:ext uri="{909E8E84-426E-40DD-AFC4-6F175D3DCCD1}">
+              <a14:hiddenFill xmlns:a14="http://schemas.microsoft.com/office/drawing/2010/main">
+                <a:solidFill>
+                  <a:schemeClr val="accent1"/>
+                </a:solidFill>
+              </a14:hiddenFill>
+            </a:ext>
+            <a:ext uri="{91240B29-F687-4F45-9708-019B960494DF}">
+              <a14:hiddenLine xmlns:a14="http://schemas.microsoft.com/office/drawing/2010/main" w="9525">
+                <a:solidFill>
+                  <a:schemeClr val="tx1"/>
+                </a:solidFill>
+                <a:miter lim="800000"/>
+                <a:headEnd/>
+                <a:tailEnd/>
+              </a14:hiddenLine>
+            </a:ext>
+            <a:ext uri="{AF507438-7753-43E0-B8FC-AC1667EBCBE1}">
+              <a14:hiddenEffects xmlns:a14="http://schemas.microsoft.com/office/drawing/2010/main">
+                <a:effectLst>
+                  <a:outerShdw dist="35921" dir="2700000" algn="ctr" rotWithShape="0">
+                    <a:schemeClr val="bg2"/>
+                  </a:outerShdw>
+                </a:effectLst>
+              </a14:hiddenEffects>
+            </a:ext>
+          </a:extLst>
+        </p:spPr>
+      </p:pic>
+      <p:pic>
+        <p:nvPicPr>
+          <p:cNvPr id="3075" name="Picture 3"/>
+          <p:cNvPicPr>
+            <a:picLocks noChangeAspect="1" noChangeArrowheads="1"/>
+          </p:cNvPicPr>
+          <p:nvPr/>
+        </p:nvPicPr>
+        <p:blipFill>
+          <a:blip r:embed="rId3">
+            <a:extLst>
+              <a:ext uri="{28A0092B-C50C-407E-A947-70E740481C1C}">
+                <a14:useLocalDpi xmlns:a14="http://schemas.microsoft.com/office/drawing/2010/main" val="0"/>
+              </a:ext>
+            </a:extLst>
+          </a:blip>
+          <a:srcRect/>
+          <a:stretch>
+            <a:fillRect/>
+          </a:stretch>
+        </p:blipFill>
+        <p:spPr bwMode="auto">
+          <a:xfrm>
+            <a:off x="395536" y="4221088"/>
+            <a:ext cx="8568952" cy="1224136"/>
+          </a:xfrm>
+          <a:prstGeom prst="rect">
+            <a:avLst/>
+          </a:prstGeom>
+          <a:noFill/>
+          <a:ln>
+            <a:noFill/>
+          </a:ln>
+          <a:effectLst/>
+          <a:extLst>
+            <a:ext uri="{909E8E84-426E-40DD-AFC4-6F175D3DCCD1}">
+              <a14:hiddenFill xmlns:a14="http://schemas.microsoft.com/office/drawing/2010/main">
+                <a:solidFill>
+                  <a:schemeClr val="accent1"/>
+                </a:solidFill>
+              </a14:hiddenFill>
+            </a:ext>
+            <a:ext uri="{91240B29-F687-4F45-9708-019B960494DF}">
+              <a14:hiddenLine xmlns:a14="http://schemas.microsoft.com/office/drawing/2010/main" w="9525">
+                <a:solidFill>
+                  <a:schemeClr val="tx1"/>
+                </a:solidFill>
+                <a:miter lim="800000"/>
+                <a:headEnd/>
+                <a:tailEnd/>
+              </a14:hiddenLine>
+            </a:ext>
+            <a:ext uri="{AF507438-7753-43E0-B8FC-AC1667EBCBE1}">
+              <a14:hiddenEffects xmlns:a14="http://schemas.microsoft.com/office/drawing/2010/main">
+                <a:effectLst>
+                  <a:outerShdw dist="35921" dir="2700000" algn="ctr" rotWithShape="0">
+                    <a:schemeClr val="bg2"/>
+                  </a:outerShdw>
+                </a:effectLst>
+              </a14:hiddenEffects>
+            </a:ext>
+          </a:extLst>
+        </p:spPr>
+      </p:pic>
+      <p:cxnSp>
+        <p:nvCxnSpPr>
+          <p:cNvPr id="5" name="Прямая со стрелкой 4"/>
+          <p:cNvCxnSpPr/>
+          <p:nvPr/>
+        </p:nvCxnSpPr>
+        <p:spPr>
+          <a:xfrm>
+            <a:off x="5076056" y="2924944"/>
+            <a:ext cx="1296144" cy="1296144"/>
+          </a:xfrm>
+          <a:prstGeom prst="straightConnector1">
+            <a:avLst/>
+          </a:prstGeom>
+          <a:ln>
+            <a:tailEnd type="arrow"/>
+          </a:ln>
+        </p:spPr>
+        <p:style>
+          <a:lnRef idx="1">
+            <a:schemeClr val="accent1"/>
+          </a:lnRef>
+          <a:fillRef idx="0">
+            <a:schemeClr val="accent1"/>
+          </a:fillRef>
+          <a:effectRef idx="0">
+            <a:schemeClr val="accent1"/>
+          </a:effectRef>
+          <a:fontRef idx="minor">
+            <a:schemeClr val="tx1"/>
+          </a:fontRef>
+        </p:style>
+      </p:cxnSp>
+    </p:spTree>
+    <p:extLst>
+      <p:ext uri="{BB962C8B-B14F-4D97-AF65-F5344CB8AC3E}">
+        <p14:creationId xmlns:p14="http://schemas.microsoft.com/office/powerpoint/2010/main" val="412686554"/>
+      </p:ext>
+    </p:extLst>
+  </p:cSld>
+  <p:clrMapOvr>
+    <a:masterClrMapping/>
+  </p:clrMapOvr>
+  <p:timing>
+    <p:tnLst>
+      <p:par>
+        <p:cTn id="1" dur="indefinite" restart="never" nodeType="tmRoot"/>
+      </p:par>
+    </p:tnLst>
+  </p:timing>
+</p:sld>
+</file>
+
+<file path=ppt/slides/slide57.xml><?xml version="1.0" encoding="utf-8"?>
+<p:sld xmlns:a="http://schemas.openxmlformats.org/drawingml/2006/main" xmlns:r="http://schemas.openxmlformats.org/officeDocument/2006/relationships" xmlns:p="http://schemas.openxmlformats.org/presentationml/2006/main">
+  <p:cSld>
+    <p:spTree>
+      <p:nvGrpSpPr>
+        <p:cNvPr id="1" name=""/>
+        <p:cNvGrpSpPr/>
+        <p:nvPr/>
+      </p:nvGrpSpPr>
+      <p:grpSpPr>
+        <a:xfrm>
+          <a:off x="0" y="0"/>
+          <a:ext cx="0" cy="0"/>
+          <a:chOff x="0" y="0"/>
+          <a:chExt cx="0" cy="0"/>
+        </a:xfrm>
+      </p:grpSpPr>
+      <p:sp>
+        <p:nvSpPr>
+          <p:cNvPr id="2" name="Заголовок 1"/>
+          <p:cNvSpPr>
+            <a:spLocks noGrp="1"/>
+          </p:cNvSpPr>
+          <p:nvPr>
+            <p:ph type="title"/>
+          </p:nvPr>
+        </p:nvSpPr>
+        <p:spPr/>
+        <p:txBody>
+          <a:bodyPr/>
+          <a:lstStyle/>
+          <a:p>
+            <a:r>
+              <a:rPr lang="ru-RU" dirty="0" smtClean="0"/>
+              <a:t>Поиск элемента в элементе</a:t>
+            </a:r>
+            <a:endParaRPr lang="ru-RU" dirty="0"/>
+          </a:p>
+        </p:txBody>
+      </p:sp>
+      <p:sp>
+        <p:nvSpPr>
+          <p:cNvPr id="3" name="Номер слайда 2"/>
+          <p:cNvSpPr>
+            <a:spLocks noGrp="1"/>
+          </p:cNvSpPr>
+          <p:nvPr>
+            <p:ph type="sldNum" sz="quarter" idx="12"/>
+          </p:nvPr>
+        </p:nvSpPr>
+        <p:spPr/>
+        <p:txBody>
+          <a:bodyPr/>
+          <a:lstStyle/>
+          <a:p>
+            <a:fld id="{856B8CD2-A8B3-41B0-B02C-5B2C28F6DA9C}" type="slidenum">
+              <a:rPr lang="ru-RU" smtClean="0"/>
+              <a:t>57</a:t>
+            </a:fld>
+            <a:endParaRPr lang="ru-RU"/>
+          </a:p>
+        </p:txBody>
+      </p:sp>
+      <p:pic>
+        <p:nvPicPr>
+          <p:cNvPr id="4100" name="Picture 4"/>
+          <p:cNvPicPr>
+            <a:picLocks noChangeAspect="1" noChangeArrowheads="1"/>
+          </p:cNvPicPr>
+          <p:nvPr/>
+        </p:nvPicPr>
+        <p:blipFill>
+          <a:blip r:embed="rId2">
+            <a:extLst>
+              <a:ext uri="{28A0092B-C50C-407E-A947-70E740481C1C}">
+                <a14:useLocalDpi xmlns:a14="http://schemas.microsoft.com/office/drawing/2010/main" val="0"/>
+              </a:ext>
+            </a:extLst>
+          </a:blip>
+          <a:srcRect/>
+          <a:stretch>
+            <a:fillRect/>
+          </a:stretch>
+        </p:blipFill>
+        <p:spPr bwMode="auto">
+          <a:xfrm>
+            <a:off x="222516" y="1268760"/>
+            <a:ext cx="8742363" cy="3933825"/>
+          </a:xfrm>
+          <a:prstGeom prst="rect">
+            <a:avLst/>
+          </a:prstGeom>
+          <a:noFill/>
+          <a:ln>
+            <a:noFill/>
+          </a:ln>
+          <a:effectLst/>
+          <a:extLst>
+            <a:ext uri="{909E8E84-426E-40DD-AFC4-6F175D3DCCD1}">
+              <a14:hiddenFill xmlns:a14="http://schemas.microsoft.com/office/drawing/2010/main">
+                <a:solidFill>
+                  <a:schemeClr val="accent1"/>
+                </a:solidFill>
+              </a14:hiddenFill>
+            </a:ext>
+            <a:ext uri="{91240B29-F687-4F45-9708-019B960494DF}">
+              <a14:hiddenLine xmlns:a14="http://schemas.microsoft.com/office/drawing/2010/main" w="9525">
+                <a:solidFill>
+                  <a:schemeClr val="tx1"/>
+                </a:solidFill>
+                <a:miter lim="800000"/>
+                <a:headEnd/>
+                <a:tailEnd/>
+              </a14:hiddenLine>
+            </a:ext>
+            <a:ext uri="{AF507438-7753-43E0-B8FC-AC1667EBCBE1}">
+              <a14:hiddenEffects xmlns:a14="http://schemas.microsoft.com/office/drawing/2010/main">
+                <a:effectLst>
+                  <a:outerShdw dist="35921" dir="2700000" algn="ctr" rotWithShape="0">
+                    <a:schemeClr val="bg2"/>
+                  </a:outerShdw>
+                </a:effectLst>
+              </a14:hiddenEffects>
+            </a:ext>
+          </a:extLst>
+        </p:spPr>
+      </p:pic>
+      <p:pic>
+        <p:nvPicPr>
+          <p:cNvPr id="4098" name="Picture 2"/>
+          <p:cNvPicPr>
+            <a:picLocks noChangeAspect="1" noChangeArrowheads="1"/>
+          </p:cNvPicPr>
+          <p:nvPr/>
+        </p:nvPicPr>
+        <p:blipFill>
+          <a:blip r:embed="rId3">
+            <a:extLst>
+              <a:ext uri="{28A0092B-C50C-407E-A947-70E740481C1C}">
+                <a14:useLocalDpi xmlns:a14="http://schemas.microsoft.com/office/drawing/2010/main" val="0"/>
+              </a:ext>
+            </a:extLst>
+          </a:blip>
+          <a:srcRect/>
+          <a:stretch>
+            <a:fillRect/>
+          </a:stretch>
+        </p:blipFill>
+        <p:spPr bwMode="auto">
+          <a:xfrm>
+            <a:off x="395536" y="4941168"/>
+            <a:ext cx="7128792" cy="1584176"/>
+          </a:xfrm>
+          <a:prstGeom prst="rect">
+            <a:avLst/>
+          </a:prstGeom>
+          <a:noFill/>
+          <a:ln>
+            <a:noFill/>
+          </a:ln>
+          <a:effectLst>
+            <a:glow rad="101600">
+              <a:schemeClr val="accent4">
+                <a:satMod val="175000"/>
+                <a:alpha val="40000"/>
+              </a:schemeClr>
+            </a:glow>
+            <a:outerShdw dist="35921" dir="2700000" algn="ctr" rotWithShape="0">
+              <a:schemeClr val="bg2"/>
+            </a:outerShdw>
+          </a:effectLst>
+          <a:extLst>
+            <a:ext uri="{909E8E84-426E-40DD-AFC4-6F175D3DCCD1}">
+              <a14:hiddenFill xmlns:a14="http://schemas.microsoft.com/office/drawing/2010/main">
+                <a:solidFill>
+                  <a:schemeClr val="accent1"/>
+                </a:solidFill>
+              </a14:hiddenFill>
+            </a:ext>
+            <a:ext uri="{91240B29-F687-4F45-9708-019B960494DF}">
+              <a14:hiddenLine xmlns:a14="http://schemas.microsoft.com/office/drawing/2010/main" w="9525">
+                <a:solidFill>
+                  <a:schemeClr val="tx1"/>
+                </a:solidFill>
+                <a:miter lim="800000"/>
+                <a:headEnd/>
+                <a:tailEnd/>
+              </a14:hiddenLine>
+            </a:ext>
+          </a:extLst>
+        </p:spPr>
+      </p:pic>
+    </p:spTree>
+    <p:extLst>
+      <p:ext uri="{BB962C8B-B14F-4D97-AF65-F5344CB8AC3E}">
+        <p14:creationId xmlns:p14="http://schemas.microsoft.com/office/powerpoint/2010/main" val="418135714"/>
+      </p:ext>
+    </p:extLst>
+  </p:cSld>
+  <p:clrMapOvr>
+    <a:masterClrMapping/>
+  </p:clrMapOvr>
+  <p:timing>
+    <p:tnLst>
+      <p:par>
+        <p:cTn id="1" dur="indefinite" restart="never" nodeType="tmRoot"/>
+      </p:par>
+    </p:tnLst>
+  </p:timing>
+</p:sld>
+</file>
+
+<file path=ppt/slides/slide58.xml><?xml version="1.0" encoding="utf-8"?>
+<p:sld xmlns:a="http://schemas.openxmlformats.org/drawingml/2006/main" xmlns:r="http://schemas.openxmlformats.org/officeDocument/2006/relationships" xmlns:p="http://schemas.openxmlformats.org/presentationml/2006/main">
+  <p:cSld>
+    <p:spTree>
+      <p:nvGrpSpPr>
+        <p:cNvPr id="1" name=""/>
+        <p:cNvGrpSpPr/>
+        <p:nvPr/>
+      </p:nvGrpSpPr>
+      <p:grpSpPr>
+        <a:xfrm>
+          <a:off x="0" y="0"/>
+          <a:ext cx="0" cy="0"/>
+          <a:chOff x="0" y="0"/>
+          <a:chExt cx="0" cy="0"/>
+        </a:xfrm>
+      </p:grpSpPr>
+      <p:sp>
+        <p:nvSpPr>
+          <p:cNvPr id="2" name="Заголовок 1"/>
+          <p:cNvSpPr>
+            <a:spLocks noGrp="1"/>
+          </p:cNvSpPr>
+          <p:nvPr>
+            <p:ph type="title"/>
+          </p:nvPr>
+        </p:nvSpPr>
+        <p:spPr/>
+        <p:txBody>
+          <a:bodyPr/>
+          <a:lstStyle/>
+          <a:p>
+            <a:r>
+              <a:rPr lang="en-US" dirty="0" smtClean="0"/>
+              <a:t>CSS</a:t>
+            </a:r>
+            <a:endParaRPr lang="ru-RU" dirty="0"/>
+          </a:p>
+        </p:txBody>
+      </p:sp>
+      <p:sp>
+        <p:nvSpPr>
+          <p:cNvPr id="3" name="Номер слайда 2"/>
+          <p:cNvSpPr>
+            <a:spLocks noGrp="1"/>
+          </p:cNvSpPr>
+          <p:nvPr>
+            <p:ph type="sldNum" sz="quarter" idx="12"/>
+          </p:nvPr>
+        </p:nvSpPr>
+        <p:spPr/>
+        <p:txBody>
+          <a:bodyPr/>
+          <a:lstStyle/>
+          <a:p>
+            <a:fld id="{856B8CD2-A8B3-41B0-B02C-5B2C28F6DA9C}" type="slidenum">
+              <a:rPr lang="ru-RU" smtClean="0"/>
+              <a:t>58</a:t>
+            </a:fld>
+            <a:endParaRPr lang="ru-RU"/>
+          </a:p>
+        </p:txBody>
+      </p:sp>
+      <p:pic>
+        <p:nvPicPr>
+          <p:cNvPr id="5123" name="Picture 3"/>
+          <p:cNvPicPr>
+            <a:picLocks noChangeAspect="1" noChangeArrowheads="1"/>
+          </p:cNvPicPr>
+          <p:nvPr/>
+        </p:nvPicPr>
+        <p:blipFill>
+          <a:blip r:embed="rId2">
+            <a:extLst>
+              <a:ext uri="{28A0092B-C50C-407E-A947-70E740481C1C}">
+                <a14:useLocalDpi xmlns:a14="http://schemas.microsoft.com/office/drawing/2010/main" val="0"/>
+              </a:ext>
+            </a:extLst>
+          </a:blip>
+          <a:srcRect/>
+          <a:stretch>
+            <a:fillRect/>
+          </a:stretch>
+        </p:blipFill>
+        <p:spPr bwMode="auto">
+          <a:xfrm>
+            <a:off x="95250" y="2447925"/>
+            <a:ext cx="8951913" cy="1962150"/>
+          </a:xfrm>
+          <a:prstGeom prst="rect">
+            <a:avLst/>
+          </a:prstGeom>
+          <a:noFill/>
+          <a:ln>
+            <a:noFill/>
+          </a:ln>
+          <a:effectLst/>
+          <a:extLst>
+            <a:ext uri="{909E8E84-426E-40DD-AFC4-6F175D3DCCD1}">
+              <a14:hiddenFill xmlns:a14="http://schemas.microsoft.com/office/drawing/2010/main">
+                <a:solidFill>
+                  <a:schemeClr val="accent1"/>
+                </a:solidFill>
+              </a14:hiddenFill>
+            </a:ext>
+            <a:ext uri="{91240B29-F687-4F45-9708-019B960494DF}">
+              <a14:hiddenLine xmlns:a14="http://schemas.microsoft.com/office/drawing/2010/main" w="9525">
+                <a:solidFill>
+                  <a:schemeClr val="tx1"/>
+                </a:solidFill>
+                <a:miter lim="800000"/>
+                <a:headEnd/>
+                <a:tailEnd/>
+              </a14:hiddenLine>
+            </a:ext>
+            <a:ext uri="{AF507438-7753-43E0-B8FC-AC1667EBCBE1}">
+              <a14:hiddenEffects xmlns:a14="http://schemas.microsoft.com/office/drawing/2010/main">
+                <a:effectLst>
+                  <a:outerShdw dist="35921" dir="2700000" algn="ctr" rotWithShape="0">
+                    <a:schemeClr val="bg2"/>
+                  </a:outerShdw>
+                </a:effectLst>
+              </a14:hiddenEffects>
+            </a:ext>
+          </a:extLst>
+        </p:spPr>
+      </p:pic>
+    </p:spTree>
+    <p:extLst>
+      <p:ext uri="{BB962C8B-B14F-4D97-AF65-F5344CB8AC3E}">
+        <p14:creationId xmlns:p14="http://schemas.microsoft.com/office/powerpoint/2010/main" val="2021480874"/>
+      </p:ext>
+    </p:extLst>
+  </p:cSld>
+  <p:clrMapOvr>
+    <a:masterClrMapping/>
+  </p:clrMapOvr>
+  <p:timing>
+    <p:tnLst>
+      <p:par>
+        <p:cTn id="1" dur="indefinite" restart="never" nodeType="tmRoot"/>
+      </p:par>
+    </p:tnLst>
+  </p:timing>
+</p:sld>
+</file>
+
+<file path=ppt/slides/slide59.xml><?xml version="1.0" encoding="utf-8"?>
+<p:sld xmlns:a="http://schemas.openxmlformats.org/drawingml/2006/main" xmlns:r="http://schemas.openxmlformats.org/officeDocument/2006/relationships" xmlns:p="http://schemas.openxmlformats.org/presentationml/2006/main">
+  <p:cSld>
+    <p:spTree>
+      <p:nvGrpSpPr>
+        <p:cNvPr id="1" name=""/>
+        <p:cNvGrpSpPr/>
+        <p:nvPr/>
+      </p:nvGrpSpPr>
+      <p:grpSpPr>
+        <a:xfrm>
+          <a:off x="0" y="0"/>
+          <a:ext cx="0" cy="0"/>
+          <a:chOff x="0" y="0"/>
+          <a:chExt cx="0" cy="0"/>
+        </a:xfrm>
+      </p:grpSpPr>
+      <p:sp>
+        <p:nvSpPr>
+          <p:cNvPr id="2" name="Заголовок 1"/>
+          <p:cNvSpPr>
+            <a:spLocks noGrp="1"/>
+          </p:cNvSpPr>
+          <p:nvPr>
+            <p:ph type="title"/>
+          </p:nvPr>
+        </p:nvSpPr>
+        <p:spPr/>
+        <p:txBody>
+          <a:bodyPr/>
+          <a:lstStyle/>
+          <a:p>
+            <a:r>
+              <a:rPr lang="en-US" dirty="0" smtClean="0"/>
+              <a:t>LINQ</a:t>
+            </a:r>
+            <a:endParaRPr lang="ru-RU" dirty="0"/>
+          </a:p>
+        </p:txBody>
+      </p:sp>
+      <p:sp>
+        <p:nvSpPr>
+          <p:cNvPr id="3" name="Номер слайда 2"/>
+          <p:cNvSpPr>
+            <a:spLocks noGrp="1"/>
+          </p:cNvSpPr>
+          <p:nvPr>
+            <p:ph type="sldNum" sz="quarter" idx="12"/>
+          </p:nvPr>
+        </p:nvSpPr>
+        <p:spPr/>
+        <p:txBody>
+          <a:bodyPr/>
+          <a:lstStyle/>
+          <a:p>
+            <a:fld id="{856B8CD2-A8B3-41B0-B02C-5B2C28F6DA9C}" type="slidenum">
+              <a:rPr lang="ru-RU" smtClean="0"/>
+              <a:t>59</a:t>
+            </a:fld>
+            <a:endParaRPr lang="ru-RU"/>
+          </a:p>
+        </p:txBody>
+      </p:sp>
+      <p:pic>
+        <p:nvPicPr>
+          <p:cNvPr id="6146" name="Picture 2"/>
+          <p:cNvPicPr>
+            <a:picLocks noChangeAspect="1" noChangeArrowheads="1"/>
+          </p:cNvPicPr>
+          <p:nvPr/>
+        </p:nvPicPr>
+        <p:blipFill>
+          <a:blip r:embed="rId2">
+            <a:extLst>
+              <a:ext uri="{28A0092B-C50C-407E-A947-70E740481C1C}">
+                <a14:useLocalDpi xmlns:a14="http://schemas.microsoft.com/office/drawing/2010/main" val="0"/>
+              </a:ext>
+            </a:extLst>
+          </a:blip>
+          <a:srcRect/>
+          <a:stretch>
+            <a:fillRect/>
+          </a:stretch>
+        </p:blipFill>
+        <p:spPr bwMode="auto">
+          <a:xfrm>
+            <a:off x="0" y="1443037"/>
+            <a:ext cx="9144000" cy="4513373"/>
+          </a:xfrm>
+          <a:prstGeom prst="rect">
+            <a:avLst/>
+          </a:prstGeom>
+          <a:noFill/>
+          <a:ln>
+            <a:noFill/>
+          </a:ln>
+          <a:effectLst/>
+          <a:extLst>
+            <a:ext uri="{909E8E84-426E-40DD-AFC4-6F175D3DCCD1}">
+              <a14:hiddenFill xmlns:a14="http://schemas.microsoft.com/office/drawing/2010/main">
+                <a:solidFill>
+                  <a:schemeClr val="accent1"/>
+                </a:solidFill>
+              </a14:hiddenFill>
+            </a:ext>
+            <a:ext uri="{91240B29-F687-4F45-9708-019B960494DF}">
+              <a14:hiddenLine xmlns:a14="http://schemas.microsoft.com/office/drawing/2010/main" w="9525">
+                <a:solidFill>
+                  <a:schemeClr val="tx1"/>
+                </a:solidFill>
+                <a:miter lim="800000"/>
+                <a:headEnd/>
+                <a:tailEnd/>
+              </a14:hiddenLine>
+            </a:ext>
+            <a:ext uri="{AF507438-7753-43E0-B8FC-AC1667EBCBE1}">
+              <a14:hiddenEffects xmlns:a14="http://schemas.microsoft.com/office/drawing/2010/main">
+                <a:effectLst>
+                  <a:outerShdw dist="35921" dir="2700000" algn="ctr" rotWithShape="0">
+                    <a:schemeClr val="bg2"/>
+                  </a:outerShdw>
+                </a:effectLst>
+              </a14:hiddenEffects>
+            </a:ext>
+          </a:extLst>
+        </p:spPr>
+      </p:pic>
+    </p:spTree>
+    <p:extLst>
+      <p:ext uri="{BB962C8B-B14F-4D97-AF65-F5344CB8AC3E}">
+        <p14:creationId xmlns:p14="http://schemas.microsoft.com/office/powerpoint/2010/main" val="2205559877"/>
       </p:ext>
     </p:extLst>
   </p:cSld>
@@ -19574,6 +20642,159 @@
     <p:extLst>
       <p:ext uri="{BB962C8B-B14F-4D97-AF65-F5344CB8AC3E}">
         <p14:creationId xmlns:p14="http://schemas.microsoft.com/office/powerpoint/2010/main" val="1702210188"/>
+      </p:ext>
+    </p:extLst>
+  </p:cSld>
+  <p:clrMapOvr>
+    <a:masterClrMapping/>
+  </p:clrMapOvr>
+  <p:timing>
+    <p:tnLst>
+      <p:par>
+        <p:cTn id="1" dur="indefinite" restart="never" nodeType="tmRoot"/>
+      </p:par>
+    </p:tnLst>
+  </p:timing>
+</p:sld>
+</file>
+
+<file path=ppt/slides/slide60.xml><?xml version="1.0" encoding="utf-8"?>
+<p:sld xmlns:a="http://schemas.openxmlformats.org/drawingml/2006/main" xmlns:r="http://schemas.openxmlformats.org/officeDocument/2006/relationships" xmlns:p="http://schemas.openxmlformats.org/presentationml/2006/main">
+  <p:cSld>
+    <p:spTree>
+      <p:nvGrpSpPr>
+        <p:cNvPr id="1" name=""/>
+        <p:cNvGrpSpPr/>
+        <p:nvPr/>
+      </p:nvGrpSpPr>
+      <p:grpSpPr>
+        <a:xfrm>
+          <a:off x="0" y="0"/>
+          <a:ext cx="0" cy="0"/>
+          <a:chOff x="0" y="0"/>
+          <a:chExt cx="0" cy="0"/>
+        </a:xfrm>
+      </p:grpSpPr>
+      <p:sp>
+        <p:nvSpPr>
+          <p:cNvPr id="2" name="Заголовок 1"/>
+          <p:cNvSpPr>
+            <a:spLocks noGrp="1"/>
+          </p:cNvSpPr>
+          <p:nvPr>
+            <p:ph type="title"/>
+          </p:nvPr>
+        </p:nvSpPr>
+        <p:spPr/>
+        <p:txBody>
+          <a:bodyPr>
+            <a:normAutofit fontScale="90000"/>
+          </a:bodyPr>
+          <a:lstStyle/>
+          <a:p>
+            <a:r>
+              <a:rPr lang="ru-RU" dirty="0" err="1" smtClean="0"/>
+              <a:t>Демо</a:t>
+            </a:r>
+            <a:r>
+              <a:rPr lang="ru-RU" dirty="0" smtClean="0"/>
+              <a:t> самого глючного приложения в мире</a:t>
+            </a:r>
+            <a:endParaRPr lang="ru-RU" dirty="0"/>
+          </a:p>
+        </p:txBody>
+      </p:sp>
+      <p:sp>
+        <p:nvSpPr>
+          <p:cNvPr id="3" name="Номер слайда 2"/>
+          <p:cNvSpPr>
+            <a:spLocks noGrp="1"/>
+          </p:cNvSpPr>
+          <p:nvPr>
+            <p:ph type="sldNum" sz="quarter" idx="12"/>
+          </p:nvPr>
+        </p:nvSpPr>
+        <p:spPr/>
+        <p:txBody>
+          <a:bodyPr/>
+          <a:lstStyle/>
+          <a:p>
+            <a:fld id="{856B8CD2-A8B3-41B0-B02C-5B2C28F6DA9C}" type="slidenum">
+              <a:rPr lang="ru-RU" smtClean="0"/>
+              <a:t>60</a:t>
+            </a:fld>
+            <a:endParaRPr lang="ru-RU"/>
+          </a:p>
+        </p:txBody>
+      </p:sp>
+      <p:pic>
+        <p:nvPicPr>
+          <p:cNvPr id="7170" name="Picture 2"/>
+          <p:cNvPicPr>
+            <a:picLocks noChangeAspect="1" noChangeArrowheads="1"/>
+          </p:cNvPicPr>
+          <p:nvPr/>
+        </p:nvPicPr>
+        <p:blipFill>
+          <a:blip r:embed="rId2">
+            <a:extLst>
+              <a:ext uri="{28A0092B-C50C-407E-A947-70E740481C1C}">
+                <a14:useLocalDpi xmlns:a14="http://schemas.microsoft.com/office/drawing/2010/main" val="0"/>
+              </a:ext>
+            </a:extLst>
+          </a:blip>
+          <a:srcRect/>
+          <a:stretch>
+            <a:fillRect/>
+          </a:stretch>
+        </p:blipFill>
+        <p:spPr bwMode="auto">
+          <a:xfrm>
+            <a:off x="1043608" y="2204864"/>
+            <a:ext cx="6665913" cy="2828925"/>
+          </a:xfrm>
+          <a:prstGeom prst="rect">
+            <a:avLst/>
+          </a:prstGeom>
+          <a:noFill/>
+          <a:ln>
+            <a:noFill/>
+          </a:ln>
+          <a:effectLst/>
+          <a:extLst>
+            <a:ext uri="{909E8E84-426E-40DD-AFC4-6F175D3DCCD1}">
+              <a14:hiddenFill xmlns:a14="http://schemas.microsoft.com/office/drawing/2010/main">
+                <a:solidFill>
+                  <a:schemeClr val="accent1"/>
+                </a:solidFill>
+              </a14:hiddenFill>
+            </a:ext>
+            <a:ext uri="{91240B29-F687-4F45-9708-019B960494DF}">
+              <a14:hiddenLine xmlns:a14="http://schemas.microsoft.com/office/drawing/2010/main" w="9525">
+                <a:solidFill>
+                  <a:schemeClr val="tx1"/>
+                </a:solidFill>
+                <a:miter lim="800000"/>
+                <a:headEnd/>
+                <a:tailEnd/>
+              </a14:hiddenLine>
+            </a:ext>
+            <a:ext uri="{AF507438-7753-43E0-B8FC-AC1667EBCBE1}">
+              <a14:hiddenEffects xmlns:a14="http://schemas.microsoft.com/office/drawing/2010/main">
+                <a:effectLst>
+                  <a:outerShdw dist="35921" dir="2700000" algn="ctr" rotWithShape="0">
+                    <a:schemeClr val="bg2"/>
+                  </a:outerShdw>
+                </a:effectLst>
+              </a14:hiddenEffects>
+            </a:ext>
+          </a:extLst>
+        </p:spPr>
+      </p:pic>
+    </p:spTree>
+    <p:extLst>
+      <p:ext uri="{BB962C8B-B14F-4D97-AF65-F5344CB8AC3E}">
+        <p14:creationId xmlns:p14="http://schemas.microsoft.com/office/powerpoint/2010/main" val="3008387519"/>
       </p:ext>
     </p:extLst>
   </p:cSld>

</xml_diff>

<commit_message>
Added 2 more Spec examples into the presentation
</commit_message>
<xml_diff>
--- a/posidelki-16/presentation/Posidelki-16 - Specflow.pptx
+++ b/posidelki-16/presentation/Posidelki-16 - Specflow.pptx
@@ -5,10 +5,10 @@
     <p:sldMasterId id="2147483648" r:id="rId1"/>
   </p:sldMasterIdLst>
   <p:notesMasterIdLst>
-    <p:notesMasterId r:id="rId62"/>
+    <p:notesMasterId r:id="rId65"/>
   </p:notesMasterIdLst>
   <p:handoutMasterIdLst>
-    <p:handoutMasterId r:id="rId63"/>
+    <p:handoutMasterId r:id="rId66"/>
   </p:handoutMasterIdLst>
   <p:sldIdLst>
     <p:sldId id="256" r:id="rId2"/>
@@ -50,27 +50,30 @@
     <p:sldId id="291" r:id="rId38"/>
     <p:sldId id="294" r:id="rId39"/>
     <p:sldId id="293" r:id="rId40"/>
-    <p:sldId id="295" r:id="rId41"/>
-    <p:sldId id="296" r:id="rId42"/>
-    <p:sldId id="297" r:id="rId43"/>
-    <p:sldId id="298" r:id="rId44"/>
-    <p:sldId id="299" r:id="rId45"/>
-    <p:sldId id="300" r:id="rId46"/>
-    <p:sldId id="301" r:id="rId47"/>
-    <p:sldId id="302" r:id="rId48"/>
-    <p:sldId id="303" r:id="rId49"/>
-    <p:sldId id="304" r:id="rId50"/>
-    <p:sldId id="305" r:id="rId51"/>
-    <p:sldId id="306" r:id="rId52"/>
-    <p:sldId id="307" r:id="rId53"/>
-    <p:sldId id="308" r:id="rId54"/>
-    <p:sldId id="309" r:id="rId55"/>
-    <p:sldId id="310" r:id="rId56"/>
-    <p:sldId id="311" r:id="rId57"/>
-    <p:sldId id="312" r:id="rId58"/>
-    <p:sldId id="313" r:id="rId59"/>
-    <p:sldId id="314" r:id="rId60"/>
-    <p:sldId id="315" r:id="rId61"/>
+    <p:sldId id="316" r:id="rId41"/>
+    <p:sldId id="317" r:id="rId42"/>
+    <p:sldId id="318" r:id="rId43"/>
+    <p:sldId id="295" r:id="rId44"/>
+    <p:sldId id="296" r:id="rId45"/>
+    <p:sldId id="297" r:id="rId46"/>
+    <p:sldId id="298" r:id="rId47"/>
+    <p:sldId id="299" r:id="rId48"/>
+    <p:sldId id="300" r:id="rId49"/>
+    <p:sldId id="301" r:id="rId50"/>
+    <p:sldId id="302" r:id="rId51"/>
+    <p:sldId id="303" r:id="rId52"/>
+    <p:sldId id="304" r:id="rId53"/>
+    <p:sldId id="305" r:id="rId54"/>
+    <p:sldId id="306" r:id="rId55"/>
+    <p:sldId id="307" r:id="rId56"/>
+    <p:sldId id="308" r:id="rId57"/>
+    <p:sldId id="309" r:id="rId58"/>
+    <p:sldId id="310" r:id="rId59"/>
+    <p:sldId id="311" r:id="rId60"/>
+    <p:sldId id="312" r:id="rId61"/>
+    <p:sldId id="313" r:id="rId62"/>
+    <p:sldId id="314" r:id="rId63"/>
+    <p:sldId id="315" r:id="rId64"/>
   </p:sldIdLst>
   <p:sldSz cx="9144000" cy="6858000" type="screen4x3"/>
   <p:notesSz cx="6858000" cy="9144000"/>
@@ -16353,7 +16356,7 @@
           <a:p>
             <a:r>
               <a:rPr lang="ru-RU" dirty="0" smtClean="0"/>
-              <a:t>Критика</a:t>
+              <a:t>И еще</a:t>
             </a:r>
             <a:endParaRPr lang="ru-RU" dirty="0"/>
           </a:p>
@@ -16361,30 +16364,7 @@
       </p:sp>
       <p:sp>
         <p:nvSpPr>
-          <p:cNvPr id="3" name="Текст 2"/>
-          <p:cNvSpPr>
-            <a:spLocks noGrp="1"/>
-          </p:cNvSpPr>
-          <p:nvPr>
-            <p:ph type="body" idx="1"/>
-          </p:nvPr>
-        </p:nvSpPr>
-        <p:spPr/>
-        <p:txBody>
-          <a:bodyPr/>
-          <a:lstStyle/>
-          <a:p>
-            <a:r>
-              <a:rPr lang="ru-RU" dirty="0" smtClean="0"/>
-              <a:t>И приглашенные звезды</a:t>
-            </a:r>
-            <a:endParaRPr lang="ru-RU" dirty="0"/>
-          </a:p>
-        </p:txBody>
-      </p:sp>
-      <p:sp>
-        <p:nvSpPr>
-          <p:cNvPr id="4" name="Номер слайда 3"/>
+          <p:cNvPr id="3" name="Номер слайда 2"/>
           <p:cNvSpPr>
             <a:spLocks noGrp="1"/>
           </p:cNvSpPr>
@@ -16405,10 +16385,117 @@
           </a:p>
         </p:txBody>
       </p:sp>
+      <p:sp>
+        <p:nvSpPr>
+          <p:cNvPr id="4" name="TextBox 3"/>
+          <p:cNvSpPr txBox="1"/>
+          <p:nvPr/>
+        </p:nvSpPr>
+        <p:spPr>
+          <a:xfrm>
+            <a:off x="395536" y="2492896"/>
+            <a:ext cx="8044190" cy="3108543"/>
+          </a:xfrm>
+          <a:prstGeom prst="rect">
+            <a:avLst/>
+          </a:prstGeom>
+          <a:noFill/>
+        </p:spPr>
+        <p:txBody>
+          <a:bodyPr wrap="none" rtlCol="0">
+            <a:spAutoFit/>
+          </a:bodyPr>
+          <a:lstStyle/>
+          <a:p>
+            <a:r>
+              <a:rPr lang="ru-RU" sz="2800" b="1" dirty="0" err="1"/>
+              <a:t>Scenario</a:t>
+            </a:r>
+            <a:r>
+              <a:rPr lang="ru-RU" sz="2800" b="1" dirty="0"/>
+              <a:t>:</a:t>
+            </a:r>
+            <a:r>
+              <a:rPr lang="ru-RU" sz="2800" dirty="0"/>
+              <a:t> При включении света – свет включается </a:t>
+            </a:r>
+            <a:endParaRPr lang="ru-RU" sz="2800" dirty="0" smtClean="0"/>
+          </a:p>
+          <a:p>
+            <a:pPr lvl="1"/>
+            <a:r>
+              <a:rPr lang="ru-RU" sz="2800" b="1" dirty="0" smtClean="0"/>
+              <a:t>Дано</a:t>
+            </a:r>
+            <a:r>
+              <a:rPr lang="ru-RU" sz="2800" dirty="0" smtClean="0"/>
+              <a:t> </a:t>
+            </a:r>
+            <a:r>
+              <a:rPr lang="ru-RU" sz="2800" dirty="0"/>
+              <a:t>свет выключен</a:t>
+            </a:r>
+          </a:p>
+          <a:p>
+            <a:pPr lvl="1"/>
+            <a:r>
+              <a:rPr lang="ru-RU" sz="2800" b="1" dirty="0"/>
+              <a:t>Когда</a:t>
+            </a:r>
+            <a:r>
+              <a:rPr lang="ru-RU" sz="2800" dirty="0"/>
+              <a:t> я включаю свет</a:t>
+            </a:r>
+          </a:p>
+          <a:p>
+            <a:pPr lvl="1"/>
+            <a:r>
+              <a:rPr lang="ru-RU" sz="2800" b="1" dirty="0"/>
+              <a:t>Тогда</a:t>
+            </a:r>
+            <a:r>
+              <a:rPr lang="ru-RU" sz="2800" dirty="0"/>
+              <a:t> свет должен быть </a:t>
+            </a:r>
+            <a:r>
+              <a:rPr lang="ru-RU" sz="2800" dirty="0" smtClean="0"/>
+              <a:t>включен</a:t>
+            </a:r>
+          </a:p>
+          <a:p>
+            <a:pPr lvl="1"/>
+            <a:endParaRPr lang="ru-RU" sz="2800" dirty="0"/>
+          </a:p>
+          <a:p>
+            <a:pPr lvl="1"/>
+            <a:endParaRPr lang="ru-RU" sz="2800" dirty="0" smtClean="0"/>
+          </a:p>
+          <a:p>
+            <a:pPr lvl="1"/>
+            <a:r>
+              <a:rPr lang="ru-RU" sz="2800" dirty="0"/>
+              <a:t>	</a:t>
+            </a:r>
+            <a:r>
+              <a:rPr lang="ru-RU" sz="2800" dirty="0" smtClean="0"/>
+              <a:t>					(Спасибо, </a:t>
+            </a:r>
+            <a:r>
+              <a:rPr lang="ru-RU" sz="2800" dirty="0" err="1" smtClean="0"/>
+              <a:t>Кэп</a:t>
+            </a:r>
+            <a:r>
+              <a:rPr lang="ru-RU" sz="2800" dirty="0" smtClean="0"/>
+              <a:t>!)</a:t>
+            </a:r>
+            <a:endParaRPr lang="ru-RU" sz="2800" dirty="0"/>
+          </a:p>
+        </p:txBody>
+      </p:sp>
     </p:spTree>
     <p:extLst>
       <p:ext uri="{BB962C8B-B14F-4D97-AF65-F5344CB8AC3E}">
-        <p14:creationId xmlns:p14="http://schemas.microsoft.com/office/powerpoint/2010/main" val="791292932"/>
+        <p14:creationId xmlns:p14="http://schemas.microsoft.com/office/powerpoint/2010/main" val="1004361996"/>
       </p:ext>
     </p:extLst>
   </p:cSld>
@@ -16459,7 +16546,7 @@
           <a:p>
             <a:r>
               <a:rPr lang="ru-RU" dirty="0" smtClean="0"/>
-              <a:t>Сказочная страна</a:t>
+              <a:t>А кто это сделал? (включил свет)</a:t>
             </a:r>
             <a:endParaRPr lang="ru-RU" dirty="0"/>
           </a:p>
@@ -16483,6 +16570,834 @@
             <a:fld id="{856B8CD2-A8B3-41B0-B02C-5B2C28F6DA9C}" type="slidenum">
               <a:rPr lang="ru-RU" smtClean="0"/>
               <a:t>41</a:t>
+            </a:fld>
+            <a:endParaRPr lang="ru-RU"/>
+          </a:p>
+        </p:txBody>
+      </p:sp>
+      <p:sp>
+        <p:nvSpPr>
+          <p:cNvPr id="4" name="TextBox 3"/>
+          <p:cNvSpPr txBox="1"/>
+          <p:nvPr/>
+        </p:nvSpPr>
+        <p:spPr>
+          <a:xfrm>
+            <a:off x="827584" y="1772815"/>
+            <a:ext cx="6319359" cy="4247317"/>
+          </a:xfrm>
+          <a:prstGeom prst="rect">
+            <a:avLst/>
+          </a:prstGeom>
+          <a:noFill/>
+        </p:spPr>
+        <p:txBody>
+          <a:bodyPr wrap="none" rtlCol="0">
+            <a:spAutoFit/>
+          </a:bodyPr>
+          <a:lstStyle/>
+          <a:p>
+            <a:r>
+              <a:rPr lang="ru-RU" sz="2800" b="1" dirty="0" err="1"/>
+              <a:t>Scenario</a:t>
+            </a:r>
+            <a:r>
+              <a:rPr lang="ru-RU" sz="2800" b="1" dirty="0"/>
+              <a:t>:</a:t>
+            </a:r>
+            <a:r>
+              <a:rPr lang="ru-RU" sz="2800" dirty="0"/>
+              <a:t> Выключатель включает свет</a:t>
+            </a:r>
+          </a:p>
+          <a:p>
+            <a:pPr lvl="1"/>
+            <a:r>
+              <a:rPr lang="ru-RU" sz="2800" b="1" dirty="0"/>
+              <a:t>Дано</a:t>
+            </a:r>
+            <a:r>
+              <a:rPr lang="ru-RU" sz="2800" dirty="0"/>
+              <a:t> свет выключен</a:t>
+            </a:r>
+          </a:p>
+          <a:p>
+            <a:pPr lvl="1"/>
+            <a:r>
+              <a:rPr lang="ru-RU" sz="2800" b="1" dirty="0"/>
+              <a:t>Когда</a:t>
+            </a:r>
+            <a:r>
+              <a:rPr lang="ru-RU" sz="2800" dirty="0"/>
+              <a:t> я нажимаю на выключатель</a:t>
+            </a:r>
+          </a:p>
+          <a:p>
+            <a:pPr lvl="1"/>
+            <a:r>
+              <a:rPr lang="ru-RU" sz="2800" b="1" dirty="0"/>
+              <a:t>Тогда </a:t>
+            </a:r>
+            <a:r>
+              <a:rPr lang="ru-RU" sz="2800" dirty="0"/>
+              <a:t>свет должен быть включен</a:t>
+            </a:r>
+          </a:p>
+          <a:p>
+            <a:endParaRPr lang="ru-RU" sz="2800" dirty="0"/>
+          </a:p>
+          <a:p>
+            <a:r>
+              <a:rPr lang="ru-RU" sz="2800" b="1" dirty="0" err="1"/>
+              <a:t>Scenario</a:t>
+            </a:r>
+            <a:r>
+              <a:rPr lang="ru-RU" sz="2800" b="1" dirty="0"/>
+              <a:t>:</a:t>
+            </a:r>
+            <a:r>
+              <a:rPr lang="ru-RU" sz="2800" dirty="0"/>
+              <a:t> Выключатель выключает свет</a:t>
+            </a:r>
+          </a:p>
+          <a:p>
+            <a:pPr lvl="1"/>
+            <a:r>
+              <a:rPr lang="ru-RU" sz="2800" b="1" dirty="0"/>
+              <a:t>Дано</a:t>
+            </a:r>
+            <a:r>
+              <a:rPr lang="ru-RU" sz="2800" dirty="0"/>
+              <a:t> свет </a:t>
+            </a:r>
+            <a:r>
+              <a:rPr lang="ru-RU" sz="2800" dirty="0" err="1" smtClean="0"/>
+              <a:t>вылючен</a:t>
+            </a:r>
+            <a:endParaRPr lang="ru-RU" sz="2800" dirty="0"/>
+          </a:p>
+          <a:p>
+            <a:pPr lvl="1"/>
+            <a:r>
+              <a:rPr lang="ru-RU" sz="2800" b="1" dirty="0"/>
+              <a:t>Когда</a:t>
+            </a:r>
+            <a:r>
+              <a:rPr lang="ru-RU" sz="2800" dirty="0"/>
+              <a:t> я нажимаю на выключатель</a:t>
+            </a:r>
+          </a:p>
+          <a:p>
+            <a:pPr lvl="1"/>
+            <a:r>
+              <a:rPr lang="ru-RU" sz="2800" b="1" dirty="0"/>
+              <a:t>Тогда</a:t>
+            </a:r>
+            <a:r>
+              <a:rPr lang="ru-RU" sz="2800" dirty="0"/>
+              <a:t> свет должен быть выключен</a:t>
+            </a:r>
+          </a:p>
+          <a:p>
+            <a:endParaRPr lang="ru-RU" dirty="0"/>
+          </a:p>
+        </p:txBody>
+      </p:sp>
+    </p:spTree>
+    <p:extLst>
+      <p:ext uri="{BB962C8B-B14F-4D97-AF65-F5344CB8AC3E}">
+        <p14:creationId xmlns:p14="http://schemas.microsoft.com/office/powerpoint/2010/main" val="3792012937"/>
+      </p:ext>
+    </p:extLst>
+  </p:cSld>
+  <p:clrMapOvr>
+    <a:masterClrMapping/>
+  </p:clrMapOvr>
+  <p:timing>
+    <p:tnLst>
+      <p:par>
+        <p:cTn id="1" dur="indefinite" restart="never" nodeType="tmRoot"/>
+      </p:par>
+    </p:tnLst>
+  </p:timing>
+</p:sld>
+</file>
+
+<file path=ppt/slides/slide42.xml><?xml version="1.0" encoding="utf-8"?>
+<p:sld xmlns:a="http://schemas.openxmlformats.org/drawingml/2006/main" xmlns:r="http://schemas.openxmlformats.org/officeDocument/2006/relationships" xmlns:p="http://schemas.openxmlformats.org/presentationml/2006/main">
+  <p:cSld>
+    <p:spTree>
+      <p:nvGrpSpPr>
+        <p:cNvPr id="1" name=""/>
+        <p:cNvGrpSpPr/>
+        <p:nvPr/>
+      </p:nvGrpSpPr>
+      <p:grpSpPr>
+        <a:xfrm>
+          <a:off x="0" y="0"/>
+          <a:ext cx="0" cy="0"/>
+          <a:chOff x="0" y="0"/>
+          <a:chExt cx="0" cy="0"/>
+        </a:xfrm>
+      </p:grpSpPr>
+      <p:sp>
+        <p:nvSpPr>
+          <p:cNvPr id="2" name="Заголовок 1"/>
+          <p:cNvSpPr>
+            <a:spLocks noGrp="1"/>
+          </p:cNvSpPr>
+          <p:nvPr>
+            <p:ph type="title"/>
+          </p:nvPr>
+        </p:nvSpPr>
+        <p:spPr/>
+        <p:txBody>
+          <a:bodyPr/>
+          <a:lstStyle/>
+          <a:p>
+            <a:r>
+              <a:rPr lang="ru-RU" dirty="0" smtClean="0"/>
+              <a:t>Короче!</a:t>
+            </a:r>
+            <a:endParaRPr lang="ru-RU" dirty="0"/>
+          </a:p>
+        </p:txBody>
+      </p:sp>
+      <p:sp>
+        <p:nvSpPr>
+          <p:cNvPr id="3" name="Номер слайда 2"/>
+          <p:cNvSpPr>
+            <a:spLocks noGrp="1"/>
+          </p:cNvSpPr>
+          <p:nvPr>
+            <p:ph type="sldNum" sz="quarter" idx="12"/>
+          </p:nvPr>
+        </p:nvSpPr>
+        <p:spPr/>
+        <p:txBody>
+          <a:bodyPr/>
+          <a:lstStyle/>
+          <a:p>
+            <a:fld id="{856B8CD2-A8B3-41B0-B02C-5B2C28F6DA9C}" type="slidenum">
+              <a:rPr lang="ru-RU" smtClean="0"/>
+              <a:t>42</a:t>
+            </a:fld>
+            <a:endParaRPr lang="ru-RU"/>
+          </a:p>
+        </p:txBody>
+      </p:sp>
+      <p:sp>
+        <p:nvSpPr>
+          <p:cNvPr id="4" name="TextBox 3"/>
+          <p:cNvSpPr txBox="1"/>
+          <p:nvPr/>
+        </p:nvSpPr>
+        <p:spPr>
+          <a:xfrm>
+            <a:off x="179512" y="1916832"/>
+            <a:ext cx="8541121" cy="2585323"/>
+          </a:xfrm>
+          <a:prstGeom prst="rect">
+            <a:avLst/>
+          </a:prstGeom>
+          <a:noFill/>
+        </p:spPr>
+        <p:txBody>
+          <a:bodyPr wrap="none" rtlCol="0">
+            <a:spAutoFit/>
+          </a:bodyPr>
+          <a:lstStyle/>
+          <a:p>
+            <a:r>
+              <a:rPr lang="ru-RU" sz="2400" b="1" dirty="0" err="1"/>
+              <a:t>Scenario</a:t>
+            </a:r>
+            <a:r>
+              <a:rPr lang="ru-RU" sz="2400" b="1" dirty="0"/>
+              <a:t> </a:t>
+            </a:r>
+            <a:r>
+              <a:rPr lang="ru-RU" sz="2400" b="1" dirty="0" err="1"/>
+              <a:t>Outline</a:t>
+            </a:r>
+            <a:r>
+              <a:rPr lang="ru-RU" sz="2400" b="1" dirty="0"/>
+              <a:t>:</a:t>
+            </a:r>
+            <a:r>
+              <a:rPr lang="ru-RU" sz="2400" dirty="0"/>
+              <a:t> Выключатель контролирует состояние света</a:t>
+            </a:r>
+          </a:p>
+          <a:p>
+            <a:pPr lvl="1"/>
+            <a:r>
+              <a:rPr lang="ru-RU" sz="2400" b="1" dirty="0"/>
+              <a:t>Дано</a:t>
+            </a:r>
+            <a:r>
+              <a:rPr lang="ru-RU" sz="2400" dirty="0"/>
+              <a:t> свет </a:t>
+            </a:r>
+            <a:r>
+              <a:rPr lang="ru-RU" sz="2400" dirty="0" smtClean="0"/>
+              <a:t>&lt;</a:t>
+            </a:r>
+            <a:r>
+              <a:rPr lang="ru-RU" sz="2400" b="1" i="1" dirty="0" smtClean="0"/>
+              <a:t>в </a:t>
+            </a:r>
+            <a:r>
+              <a:rPr lang="ru-RU" sz="2400" b="1" i="1" dirty="0" smtClean="0"/>
+              <a:t>первоначальном состоянии</a:t>
+            </a:r>
+            <a:r>
+              <a:rPr lang="ru-RU" sz="2400" dirty="0" smtClean="0"/>
+              <a:t>&gt;</a:t>
+            </a:r>
+            <a:endParaRPr lang="ru-RU" sz="2400" dirty="0"/>
+          </a:p>
+          <a:p>
+            <a:pPr lvl="1"/>
+            <a:r>
+              <a:rPr lang="ru-RU" sz="2400" b="1" dirty="0"/>
+              <a:t>Когда</a:t>
+            </a:r>
+            <a:r>
+              <a:rPr lang="ru-RU" sz="2400" dirty="0"/>
+              <a:t> я нажимаю на выключатель</a:t>
+            </a:r>
+          </a:p>
+          <a:p>
+            <a:pPr lvl="1"/>
+            <a:r>
+              <a:rPr lang="ru-RU" sz="2400" b="1" dirty="0"/>
+              <a:t>Тогда</a:t>
+            </a:r>
+            <a:r>
+              <a:rPr lang="ru-RU" sz="2400" dirty="0"/>
+              <a:t> свет должен </a:t>
+            </a:r>
+            <a:r>
+              <a:rPr lang="ru-RU" sz="2400"/>
+              <a:t>быть </a:t>
+            </a:r>
+            <a:r>
+              <a:rPr lang="ru-RU" sz="2400" smtClean="0"/>
+              <a:t>&lt;</a:t>
+            </a:r>
+            <a:r>
+              <a:rPr lang="ru-RU" sz="2400" b="1" i="1" dirty="0" smtClean="0"/>
+              <a:t>в ожидаемом состоянии</a:t>
+            </a:r>
+            <a:r>
+              <a:rPr lang="ru-RU" sz="2400" dirty="0" smtClean="0"/>
+              <a:t>&gt;</a:t>
+            </a:r>
+            <a:endParaRPr lang="ru-RU" sz="2400" dirty="0" smtClean="0"/>
+          </a:p>
+          <a:p>
+            <a:endParaRPr lang="en-US" sz="2400" dirty="0" smtClean="0"/>
+          </a:p>
+          <a:p>
+            <a:r>
+              <a:rPr lang="en-US" sz="2400" b="1" dirty="0" smtClean="0"/>
+              <a:t>Examples:</a:t>
+            </a:r>
+            <a:endParaRPr lang="ru-RU" sz="2400" b="1" dirty="0"/>
+          </a:p>
+          <a:p>
+            <a:endParaRPr lang="ru-RU" dirty="0"/>
+          </a:p>
+        </p:txBody>
+      </p:sp>
+      <p:graphicFrame>
+        <p:nvGraphicFramePr>
+          <p:cNvPr id="5" name="Таблица 4"/>
+          <p:cNvGraphicFramePr>
+            <a:graphicFrameLocks noGrp="1"/>
+          </p:cNvGraphicFramePr>
+          <p:nvPr>
+            <p:extLst>
+              <p:ext uri="{D42A27DB-BD31-4B8C-83A1-F6EECF244321}">
+                <p14:modId xmlns:p14="http://schemas.microsoft.com/office/powerpoint/2010/main" val="176405858"/>
+              </p:ext>
+            </p:extLst>
+          </p:nvPr>
+        </p:nvGraphicFramePr>
+        <p:xfrm>
+          <a:off x="755576" y="4502155"/>
+          <a:ext cx="6096000" cy="1493520"/>
+        </p:xfrm>
+        <a:graphic>
+          <a:graphicData uri="http://schemas.openxmlformats.org/drawingml/2006/table">
+            <a:tbl>
+              <a:tblPr firstRow="1" bandRow="1">
+                <a:tableStyleId>{7E9639D4-E3E2-4D34-9284-5A2195B3D0D7}</a:tableStyleId>
+              </a:tblPr>
+              <a:tblGrid>
+                <a:gridCol w="3048000"/>
+                <a:gridCol w="3048000"/>
+              </a:tblGrid>
+              <a:tr h="298832">
+                <a:tc>
+                  <a:txBody>
+                    <a:bodyPr/>
+                    <a:lstStyle/>
+                    <a:p>
+                      <a:pPr algn="ctr"/>
+                      <a:r>
+                        <a:rPr lang="ru-RU" sz="2000" dirty="0" smtClean="0"/>
+                        <a:t>в первоначальном состоянии</a:t>
+                      </a:r>
+                      <a:endParaRPr lang="ru-RU" sz="2000" dirty="0"/>
+                    </a:p>
+                  </a:txBody>
+                  <a:tcPr>
+                    <a:lnB w="12700" cap="flat" cmpd="sng" algn="ctr">
+                      <a:solidFill>
+                        <a:schemeClr val="tx1"/>
+                      </a:solidFill>
+                      <a:prstDash val="solid"/>
+                      <a:round/>
+                      <a:headEnd type="none" w="med" len="med"/>
+                      <a:tailEnd type="none" w="med" len="med"/>
+                    </a:lnB>
+                  </a:tcPr>
+                </a:tc>
+                <a:tc>
+                  <a:txBody>
+                    <a:bodyPr/>
+                    <a:lstStyle/>
+                    <a:p>
+                      <a:pPr algn="ctr"/>
+                      <a:r>
+                        <a:rPr lang="ru-RU" sz="2000" dirty="0" smtClean="0"/>
+                        <a:t>в ожидаемом состоянии</a:t>
+                      </a:r>
+                      <a:endParaRPr lang="ru-RU" sz="2000" dirty="0"/>
+                    </a:p>
+                  </a:txBody>
+                  <a:tcPr>
+                    <a:lnB w="12700" cap="flat" cmpd="sng" algn="ctr">
+                      <a:solidFill>
+                        <a:schemeClr val="tx1"/>
+                      </a:solidFill>
+                      <a:prstDash val="solid"/>
+                      <a:round/>
+                      <a:headEnd type="none" w="med" len="med"/>
+                      <a:tailEnd type="none" w="med" len="med"/>
+                    </a:lnB>
+                  </a:tcPr>
+                </a:tc>
+              </a:tr>
+              <a:tr h="370840">
+                <a:tc>
+                  <a:txBody>
+                    <a:bodyPr/>
+                    <a:lstStyle/>
+                    <a:p>
+                      <a:pPr algn="ctr"/>
+                      <a:r>
+                        <a:rPr lang="ru-RU" sz="2000" dirty="0" smtClean="0"/>
+                        <a:t>включен</a:t>
+                      </a:r>
+                      <a:endParaRPr lang="ru-RU" sz="2000" dirty="0"/>
+                    </a:p>
+                  </a:txBody>
+                  <a:tcPr>
+                    <a:lnL w="12700" cap="flat" cmpd="sng" algn="ctr">
+                      <a:solidFill>
+                        <a:schemeClr val="tx1"/>
+                      </a:solidFill>
+                      <a:prstDash val="solid"/>
+                      <a:round/>
+                      <a:headEnd type="none" w="med" len="med"/>
+                      <a:tailEnd type="none" w="med" len="med"/>
+                    </a:lnL>
+                    <a:lnR w="12700" cap="flat" cmpd="sng" algn="ctr">
+                      <a:solidFill>
+                        <a:schemeClr val="tx1"/>
+                      </a:solidFill>
+                      <a:prstDash val="solid"/>
+                      <a:round/>
+                      <a:headEnd type="none" w="med" len="med"/>
+                      <a:tailEnd type="none" w="med" len="med"/>
+                    </a:lnR>
+                    <a:lnT w="12700" cap="flat" cmpd="sng" algn="ctr">
+                      <a:solidFill>
+                        <a:schemeClr val="tx1"/>
+                      </a:solidFill>
+                      <a:prstDash val="solid"/>
+                      <a:round/>
+                      <a:headEnd type="none" w="med" len="med"/>
+                      <a:tailEnd type="none" w="med" len="med"/>
+                    </a:lnT>
+                    <a:lnB w="12700" cap="flat" cmpd="sng" algn="ctr">
+                      <a:solidFill>
+                        <a:schemeClr val="tx1"/>
+                      </a:solidFill>
+                      <a:prstDash val="solid"/>
+                      <a:round/>
+                      <a:headEnd type="none" w="med" len="med"/>
+                      <a:tailEnd type="none" w="med" len="med"/>
+                    </a:lnB>
+                  </a:tcPr>
+                </a:tc>
+                <a:tc>
+                  <a:txBody>
+                    <a:bodyPr/>
+                    <a:lstStyle/>
+                    <a:p>
+                      <a:pPr algn="ctr"/>
+                      <a:r>
+                        <a:rPr lang="ru-RU" sz="2000" dirty="0" smtClean="0"/>
+                        <a:t>выключен</a:t>
+                      </a:r>
+                      <a:endParaRPr lang="ru-RU" sz="2000" dirty="0"/>
+                    </a:p>
+                  </a:txBody>
+                  <a:tcPr>
+                    <a:lnL w="12700" cap="flat" cmpd="sng" algn="ctr">
+                      <a:solidFill>
+                        <a:schemeClr val="tx1"/>
+                      </a:solidFill>
+                      <a:prstDash val="solid"/>
+                      <a:round/>
+                      <a:headEnd type="none" w="med" len="med"/>
+                      <a:tailEnd type="none" w="med" len="med"/>
+                    </a:lnL>
+                    <a:lnR w="12700" cap="flat" cmpd="sng" algn="ctr">
+                      <a:solidFill>
+                        <a:schemeClr val="tx1"/>
+                      </a:solidFill>
+                      <a:prstDash val="solid"/>
+                      <a:round/>
+                      <a:headEnd type="none" w="med" len="med"/>
+                      <a:tailEnd type="none" w="med" len="med"/>
+                    </a:lnR>
+                    <a:lnT w="12700" cap="flat" cmpd="sng" algn="ctr">
+                      <a:solidFill>
+                        <a:schemeClr val="tx1"/>
+                      </a:solidFill>
+                      <a:prstDash val="solid"/>
+                      <a:round/>
+                      <a:headEnd type="none" w="med" len="med"/>
+                      <a:tailEnd type="none" w="med" len="med"/>
+                    </a:lnT>
+                    <a:lnB w="12700" cap="flat" cmpd="sng" algn="ctr">
+                      <a:solidFill>
+                        <a:schemeClr val="tx1"/>
+                      </a:solidFill>
+                      <a:prstDash val="solid"/>
+                      <a:round/>
+                      <a:headEnd type="none" w="med" len="med"/>
+                      <a:tailEnd type="none" w="med" len="med"/>
+                    </a:lnB>
+                    <a:lnTlToBr w="12700" cmpd="sng">
+                      <a:noFill/>
+                      <a:prstDash val="solid"/>
+                    </a:lnTlToBr>
+                    <a:lnBlToTr w="12700" cmpd="sng">
+                      <a:noFill/>
+                      <a:prstDash val="solid"/>
+                    </a:lnBlToTr>
+                  </a:tcPr>
+                </a:tc>
+              </a:tr>
+              <a:tr h="370840">
+                <a:tc>
+                  <a:txBody>
+                    <a:bodyPr/>
+                    <a:lstStyle/>
+                    <a:p>
+                      <a:pPr algn="ctr"/>
+                      <a:r>
+                        <a:rPr lang="ru-RU" sz="2000" dirty="0" smtClean="0"/>
+                        <a:t>выключен</a:t>
+                      </a:r>
+                      <a:endParaRPr lang="ru-RU" sz="2000" dirty="0"/>
+                    </a:p>
+                  </a:txBody>
+                  <a:tcPr>
+                    <a:lnL w="12700" cap="flat" cmpd="sng" algn="ctr">
+                      <a:solidFill>
+                        <a:schemeClr val="tx1"/>
+                      </a:solidFill>
+                      <a:prstDash val="solid"/>
+                      <a:round/>
+                      <a:headEnd type="none" w="med" len="med"/>
+                      <a:tailEnd type="none" w="med" len="med"/>
+                    </a:lnL>
+                    <a:lnR w="12700" cap="flat" cmpd="sng" algn="ctr">
+                      <a:solidFill>
+                        <a:schemeClr val="tx1"/>
+                      </a:solidFill>
+                      <a:prstDash val="solid"/>
+                      <a:round/>
+                      <a:headEnd type="none" w="med" len="med"/>
+                      <a:tailEnd type="none" w="med" len="med"/>
+                    </a:lnR>
+                    <a:lnT w="12700" cap="flat" cmpd="sng" algn="ctr">
+                      <a:solidFill>
+                        <a:schemeClr val="tx1"/>
+                      </a:solidFill>
+                      <a:prstDash val="solid"/>
+                      <a:round/>
+                      <a:headEnd type="none" w="med" len="med"/>
+                      <a:tailEnd type="none" w="med" len="med"/>
+                    </a:lnT>
+                    <a:lnB w="12700" cap="flat" cmpd="sng" algn="ctr">
+                      <a:solidFill>
+                        <a:schemeClr val="tx1"/>
+                      </a:solidFill>
+                      <a:prstDash val="solid"/>
+                      <a:round/>
+                      <a:headEnd type="none" w="med" len="med"/>
+                      <a:tailEnd type="none" w="med" len="med"/>
+                    </a:lnB>
+                  </a:tcPr>
+                </a:tc>
+                <a:tc>
+                  <a:txBody>
+                    <a:bodyPr/>
+                    <a:lstStyle/>
+                    <a:p>
+                      <a:pPr algn="ctr"/>
+                      <a:r>
+                        <a:rPr lang="ru-RU" sz="2000" dirty="0" smtClean="0"/>
+                        <a:t>включен</a:t>
+                      </a:r>
+                    </a:p>
+                  </a:txBody>
+                  <a:tcPr>
+                    <a:lnL w="12700" cap="flat" cmpd="sng" algn="ctr">
+                      <a:solidFill>
+                        <a:schemeClr val="tx1"/>
+                      </a:solidFill>
+                      <a:prstDash val="solid"/>
+                      <a:round/>
+                      <a:headEnd type="none" w="med" len="med"/>
+                      <a:tailEnd type="none" w="med" len="med"/>
+                    </a:lnL>
+                    <a:lnR w="12700" cap="flat" cmpd="sng" algn="ctr">
+                      <a:solidFill>
+                        <a:schemeClr val="tx1"/>
+                      </a:solidFill>
+                      <a:prstDash val="solid"/>
+                      <a:round/>
+                      <a:headEnd type="none" w="med" len="med"/>
+                      <a:tailEnd type="none" w="med" len="med"/>
+                    </a:lnR>
+                    <a:lnT w="12700" cap="flat" cmpd="sng" algn="ctr">
+                      <a:solidFill>
+                        <a:schemeClr val="tx1"/>
+                      </a:solidFill>
+                      <a:prstDash val="solid"/>
+                      <a:round/>
+                      <a:headEnd type="none" w="med" len="med"/>
+                      <a:tailEnd type="none" w="med" len="med"/>
+                    </a:lnT>
+                    <a:lnB w="12700" cap="flat" cmpd="sng" algn="ctr">
+                      <a:solidFill>
+                        <a:schemeClr val="tx1"/>
+                      </a:solidFill>
+                      <a:prstDash val="solid"/>
+                      <a:round/>
+                      <a:headEnd type="none" w="med" len="med"/>
+                      <a:tailEnd type="none" w="med" len="med"/>
+                    </a:lnB>
+                  </a:tcPr>
+                </a:tc>
+              </a:tr>
+            </a:tbl>
+          </a:graphicData>
+        </a:graphic>
+      </p:graphicFrame>
+    </p:spTree>
+    <p:extLst>
+      <p:ext uri="{BB962C8B-B14F-4D97-AF65-F5344CB8AC3E}">
+        <p14:creationId xmlns:p14="http://schemas.microsoft.com/office/powerpoint/2010/main" val="4073510365"/>
+      </p:ext>
+    </p:extLst>
+  </p:cSld>
+  <p:clrMapOvr>
+    <a:masterClrMapping/>
+  </p:clrMapOvr>
+  <p:timing>
+    <p:tnLst>
+      <p:par>
+        <p:cTn id="1" dur="indefinite" restart="never" nodeType="tmRoot"/>
+      </p:par>
+    </p:tnLst>
+  </p:timing>
+</p:sld>
+</file>
+
+<file path=ppt/slides/slide43.xml><?xml version="1.0" encoding="utf-8"?>
+<p:sld xmlns:a="http://schemas.openxmlformats.org/drawingml/2006/main" xmlns:r="http://schemas.openxmlformats.org/officeDocument/2006/relationships" xmlns:p="http://schemas.openxmlformats.org/presentationml/2006/main">
+  <p:cSld>
+    <p:spTree>
+      <p:nvGrpSpPr>
+        <p:cNvPr id="1" name=""/>
+        <p:cNvGrpSpPr/>
+        <p:nvPr/>
+      </p:nvGrpSpPr>
+      <p:grpSpPr>
+        <a:xfrm>
+          <a:off x="0" y="0"/>
+          <a:ext cx="0" cy="0"/>
+          <a:chOff x="0" y="0"/>
+          <a:chExt cx="0" cy="0"/>
+        </a:xfrm>
+      </p:grpSpPr>
+      <p:sp>
+        <p:nvSpPr>
+          <p:cNvPr id="2" name="Заголовок 1"/>
+          <p:cNvSpPr>
+            <a:spLocks noGrp="1"/>
+          </p:cNvSpPr>
+          <p:nvPr>
+            <p:ph type="title"/>
+          </p:nvPr>
+        </p:nvSpPr>
+        <p:spPr/>
+        <p:txBody>
+          <a:bodyPr/>
+          <a:lstStyle/>
+          <a:p>
+            <a:r>
+              <a:rPr lang="ru-RU" dirty="0" smtClean="0"/>
+              <a:t>Критика</a:t>
+            </a:r>
+            <a:endParaRPr lang="ru-RU" dirty="0"/>
+          </a:p>
+        </p:txBody>
+      </p:sp>
+      <p:sp>
+        <p:nvSpPr>
+          <p:cNvPr id="3" name="Текст 2"/>
+          <p:cNvSpPr>
+            <a:spLocks noGrp="1"/>
+          </p:cNvSpPr>
+          <p:nvPr>
+            <p:ph type="body" idx="1"/>
+          </p:nvPr>
+        </p:nvSpPr>
+        <p:spPr/>
+        <p:txBody>
+          <a:bodyPr/>
+          <a:lstStyle/>
+          <a:p>
+            <a:r>
+              <a:rPr lang="ru-RU" dirty="0" smtClean="0"/>
+              <a:t>И приглашенные звезды</a:t>
+            </a:r>
+            <a:endParaRPr lang="ru-RU" dirty="0"/>
+          </a:p>
+        </p:txBody>
+      </p:sp>
+      <p:sp>
+        <p:nvSpPr>
+          <p:cNvPr id="4" name="Номер слайда 3"/>
+          <p:cNvSpPr>
+            <a:spLocks noGrp="1"/>
+          </p:cNvSpPr>
+          <p:nvPr>
+            <p:ph type="sldNum" sz="quarter" idx="12"/>
+          </p:nvPr>
+        </p:nvSpPr>
+        <p:spPr/>
+        <p:txBody>
+          <a:bodyPr/>
+          <a:lstStyle/>
+          <a:p>
+            <a:fld id="{856B8CD2-A8B3-41B0-B02C-5B2C28F6DA9C}" type="slidenum">
+              <a:rPr lang="ru-RU" smtClean="0"/>
+              <a:t>43</a:t>
+            </a:fld>
+            <a:endParaRPr lang="ru-RU"/>
+          </a:p>
+        </p:txBody>
+      </p:sp>
+    </p:spTree>
+    <p:extLst>
+      <p:ext uri="{BB962C8B-B14F-4D97-AF65-F5344CB8AC3E}">
+        <p14:creationId xmlns:p14="http://schemas.microsoft.com/office/powerpoint/2010/main" val="791292932"/>
+      </p:ext>
+    </p:extLst>
+  </p:cSld>
+  <p:clrMapOvr>
+    <a:masterClrMapping/>
+  </p:clrMapOvr>
+  <p:timing>
+    <p:tnLst>
+      <p:par>
+        <p:cTn id="1" dur="indefinite" restart="never" nodeType="tmRoot"/>
+      </p:par>
+    </p:tnLst>
+  </p:timing>
+</p:sld>
+</file>
+
+<file path=ppt/slides/slide44.xml><?xml version="1.0" encoding="utf-8"?>
+<p:sld xmlns:a="http://schemas.openxmlformats.org/drawingml/2006/main" xmlns:r="http://schemas.openxmlformats.org/officeDocument/2006/relationships" xmlns:p="http://schemas.openxmlformats.org/presentationml/2006/main">
+  <p:cSld>
+    <p:spTree>
+      <p:nvGrpSpPr>
+        <p:cNvPr id="1" name=""/>
+        <p:cNvGrpSpPr/>
+        <p:nvPr/>
+      </p:nvGrpSpPr>
+      <p:grpSpPr>
+        <a:xfrm>
+          <a:off x="0" y="0"/>
+          <a:ext cx="0" cy="0"/>
+          <a:chOff x="0" y="0"/>
+          <a:chExt cx="0" cy="0"/>
+        </a:xfrm>
+      </p:grpSpPr>
+      <p:sp>
+        <p:nvSpPr>
+          <p:cNvPr id="2" name="Заголовок 1"/>
+          <p:cNvSpPr>
+            <a:spLocks noGrp="1"/>
+          </p:cNvSpPr>
+          <p:nvPr>
+            <p:ph type="title"/>
+          </p:nvPr>
+        </p:nvSpPr>
+        <p:spPr/>
+        <p:txBody>
+          <a:bodyPr/>
+          <a:lstStyle/>
+          <a:p>
+            <a:r>
+              <a:rPr lang="ru-RU" dirty="0" smtClean="0"/>
+              <a:t>Сказочная страна</a:t>
+            </a:r>
+            <a:endParaRPr lang="ru-RU" dirty="0"/>
+          </a:p>
+        </p:txBody>
+      </p:sp>
+      <p:sp>
+        <p:nvSpPr>
+          <p:cNvPr id="3" name="Номер слайда 2"/>
+          <p:cNvSpPr>
+            <a:spLocks noGrp="1"/>
+          </p:cNvSpPr>
+          <p:nvPr>
+            <p:ph type="sldNum" sz="quarter" idx="12"/>
+          </p:nvPr>
+        </p:nvSpPr>
+        <p:spPr/>
+        <p:txBody>
+          <a:bodyPr/>
+          <a:lstStyle/>
+          <a:p>
+            <a:fld id="{856B8CD2-A8B3-41B0-B02C-5B2C28F6DA9C}" type="slidenum">
+              <a:rPr lang="ru-RU" smtClean="0"/>
+              <a:t>44</a:t>
             </a:fld>
             <a:endParaRPr lang="ru-RU"/>
           </a:p>
@@ -16591,7 +17506,7 @@
 </p:sld>
 </file>
 
-<file path=ppt/slides/slide42.xml><?xml version="1.0" encoding="utf-8"?>
+<file path=ppt/slides/slide45.xml><?xml version="1.0" encoding="utf-8"?>
 <p:sld xmlns:a="http://schemas.openxmlformats.org/drawingml/2006/main" xmlns:r="http://schemas.openxmlformats.org/officeDocument/2006/relationships" xmlns:p="http://schemas.openxmlformats.org/presentationml/2006/main">
   <p:cSld>
     <p:spTree>
@@ -16648,7 +17563,7 @@
           <a:p>
             <a:fld id="{856B8CD2-A8B3-41B0-B02C-5B2C28F6DA9C}" type="slidenum">
               <a:rPr lang="ru-RU" smtClean="0"/>
-              <a:t>42</a:t>
+              <a:t>45</a:t>
             </a:fld>
             <a:endParaRPr lang="ru-RU"/>
           </a:p>
@@ -16826,7 +17741,7 @@
 </p:sld>
 </file>
 
-<file path=ppt/slides/slide43.xml><?xml version="1.0" encoding="utf-8"?>
+<file path=ppt/slides/slide46.xml><?xml version="1.0" encoding="utf-8"?>
 <p:sld xmlns:a="http://schemas.openxmlformats.org/drawingml/2006/main" xmlns:r="http://schemas.openxmlformats.org/officeDocument/2006/relationships" xmlns:p="http://schemas.openxmlformats.org/presentationml/2006/main">
   <p:cSld>
     <p:spTree>
@@ -16908,7 +17823,7 @@
           <a:p>
             <a:fld id="{856B8CD2-A8B3-41B0-B02C-5B2C28F6DA9C}" type="slidenum">
               <a:rPr lang="ru-RU" smtClean="0"/>
-              <a:t>43</a:t>
+              <a:t>46</a:t>
             </a:fld>
             <a:endParaRPr lang="ru-RU"/>
           </a:p>
@@ -17079,7 +17994,7 @@
 </p:sld>
 </file>
 
-<file path=ppt/slides/slide44.xml><?xml version="1.0" encoding="utf-8"?>
+<file path=ppt/slides/slide47.xml><?xml version="1.0" encoding="utf-8"?>
 <p:sld xmlns:a="http://schemas.openxmlformats.org/drawingml/2006/main" xmlns:r="http://schemas.openxmlformats.org/officeDocument/2006/relationships" xmlns:p="http://schemas.openxmlformats.org/presentationml/2006/main">
   <p:cSld>
     <p:spTree>
@@ -17150,7 +18065,7 @@
           <a:p>
             <a:fld id="{856B8CD2-A8B3-41B0-B02C-5B2C28F6DA9C}" type="slidenum">
               <a:rPr lang="ru-RU" smtClean="0"/>
-              <a:t>44</a:t>
+              <a:t>47</a:t>
             </a:fld>
             <a:endParaRPr lang="ru-RU"/>
           </a:p>
@@ -17453,7 +18368,7 @@
 </p:sld>
 </file>
 
-<file path=ppt/slides/slide45.xml><?xml version="1.0" encoding="utf-8"?>
+<file path=ppt/slides/slide48.xml><?xml version="1.0" encoding="utf-8"?>
 <p:sld xmlns:a="http://schemas.openxmlformats.org/drawingml/2006/main" xmlns:r="http://schemas.openxmlformats.org/officeDocument/2006/relationships" xmlns:p="http://schemas.openxmlformats.org/presentationml/2006/main">
   <p:cSld>
     <p:spTree>
@@ -17512,7 +18427,7 @@
           <a:p>
             <a:fld id="{856B8CD2-A8B3-41B0-B02C-5B2C28F6DA9C}" type="slidenum">
               <a:rPr lang="ru-RU" smtClean="0"/>
-              <a:t>45</a:t>
+              <a:t>48</a:t>
             </a:fld>
             <a:endParaRPr lang="ru-RU"/>
           </a:p>
@@ -17860,558 +18775,6 @@
 </p:sld>
 </file>
 
-<file path=ppt/slides/slide46.xml><?xml version="1.0" encoding="utf-8"?>
-<p:sld xmlns:a="http://schemas.openxmlformats.org/drawingml/2006/main" xmlns:r="http://schemas.openxmlformats.org/officeDocument/2006/relationships" xmlns:p="http://schemas.openxmlformats.org/presentationml/2006/main">
-  <p:cSld>
-    <p:spTree>
-      <p:nvGrpSpPr>
-        <p:cNvPr id="1" name=""/>
-        <p:cNvGrpSpPr/>
-        <p:nvPr/>
-      </p:nvGrpSpPr>
-      <p:grpSpPr>
-        <a:xfrm>
-          <a:off x="0" y="0"/>
-          <a:ext cx="0" cy="0"/>
-          <a:chOff x="0" y="0"/>
-          <a:chExt cx="0" cy="0"/>
-        </a:xfrm>
-      </p:grpSpPr>
-      <p:sp>
-        <p:nvSpPr>
-          <p:cNvPr id="2" name="Заголовок 1"/>
-          <p:cNvSpPr>
-            <a:spLocks noGrp="1"/>
-          </p:cNvSpPr>
-          <p:nvPr>
-            <p:ph type="title"/>
-          </p:nvPr>
-        </p:nvSpPr>
-        <p:spPr/>
-        <p:txBody>
-          <a:bodyPr>
-            <a:normAutofit/>
-          </a:bodyPr>
-          <a:lstStyle/>
-          <a:p>
-            <a:r>
-              <a:rPr lang="ru-RU" dirty="0"/>
-              <a:t>Серебряной пули действительно </a:t>
-            </a:r>
-            <a:r>
-              <a:rPr lang="ru-RU" dirty="0" smtClean="0"/>
-              <a:t>нет</a:t>
-            </a:r>
-            <a:endParaRPr lang="ru-RU" dirty="0"/>
-          </a:p>
-        </p:txBody>
-      </p:sp>
-      <p:sp>
-        <p:nvSpPr>
-          <p:cNvPr id="3" name="Текст 2"/>
-          <p:cNvSpPr>
-            <a:spLocks noGrp="1"/>
-          </p:cNvSpPr>
-          <p:nvPr>
-            <p:ph type="body" idx="1"/>
-          </p:nvPr>
-        </p:nvSpPr>
-        <p:spPr/>
-        <p:txBody>
-          <a:bodyPr/>
-          <a:lstStyle/>
-          <a:p>
-            <a:r>
-              <a:rPr lang="ru-RU" dirty="0"/>
-              <a:t>Пока что…</a:t>
-            </a:r>
-          </a:p>
-        </p:txBody>
-      </p:sp>
-      <p:sp>
-        <p:nvSpPr>
-          <p:cNvPr id="4" name="Номер слайда 3"/>
-          <p:cNvSpPr>
-            <a:spLocks noGrp="1"/>
-          </p:cNvSpPr>
-          <p:nvPr>
-            <p:ph type="sldNum" sz="quarter" idx="12"/>
-          </p:nvPr>
-        </p:nvSpPr>
-        <p:spPr/>
-        <p:txBody>
-          <a:bodyPr/>
-          <a:lstStyle/>
-          <a:p>
-            <a:fld id="{856B8CD2-A8B3-41B0-B02C-5B2C28F6DA9C}" type="slidenum">
-              <a:rPr lang="ru-RU" smtClean="0"/>
-              <a:t>46</a:t>
-            </a:fld>
-            <a:endParaRPr lang="ru-RU"/>
-          </a:p>
-        </p:txBody>
-      </p:sp>
-    </p:spTree>
-    <p:extLst>
-      <p:ext uri="{BB962C8B-B14F-4D97-AF65-F5344CB8AC3E}">
-        <p14:creationId xmlns:p14="http://schemas.microsoft.com/office/powerpoint/2010/main" val="3334280742"/>
-      </p:ext>
-    </p:extLst>
-  </p:cSld>
-  <p:clrMapOvr>
-    <a:masterClrMapping/>
-  </p:clrMapOvr>
-  <p:timing>
-    <p:tnLst>
-      <p:par>
-        <p:cTn id="1" dur="indefinite" restart="never" nodeType="tmRoot"/>
-      </p:par>
-    </p:tnLst>
-  </p:timing>
-</p:sld>
-</file>
-
-<file path=ppt/slides/slide47.xml><?xml version="1.0" encoding="utf-8"?>
-<p:sld xmlns:a="http://schemas.openxmlformats.org/drawingml/2006/main" xmlns:r="http://schemas.openxmlformats.org/officeDocument/2006/relationships" xmlns:p="http://schemas.openxmlformats.org/presentationml/2006/main">
-  <p:cSld>
-    <p:spTree>
-      <p:nvGrpSpPr>
-        <p:cNvPr id="1" name=""/>
-        <p:cNvGrpSpPr/>
-        <p:nvPr/>
-      </p:nvGrpSpPr>
-      <p:grpSpPr>
-        <a:xfrm>
-          <a:off x="0" y="0"/>
-          <a:ext cx="0" cy="0"/>
-          <a:chOff x="0" y="0"/>
-          <a:chExt cx="0" cy="0"/>
-        </a:xfrm>
-      </p:grpSpPr>
-      <p:sp>
-        <p:nvSpPr>
-          <p:cNvPr id="2" name="Заголовок 1"/>
-          <p:cNvSpPr>
-            <a:spLocks noGrp="1"/>
-          </p:cNvSpPr>
-          <p:nvPr>
-            <p:ph type="title"/>
-          </p:nvPr>
-        </p:nvSpPr>
-        <p:spPr/>
-        <p:txBody>
-          <a:bodyPr>
-            <a:normAutofit fontScale="90000"/>
-          </a:bodyPr>
-          <a:lstStyle/>
-          <a:p>
-            <a:r>
-              <a:rPr lang="ru-RU" dirty="0"/>
-              <a:t>Автоматизация не заменит </a:t>
-            </a:r>
-            <a:r>
-              <a:rPr lang="ru-RU" dirty="0" err="1"/>
-              <a:t>тестировщика</a:t>
-            </a:r>
-            <a:endParaRPr lang="ru-RU" dirty="0"/>
-          </a:p>
-        </p:txBody>
-      </p:sp>
-      <p:sp>
-        <p:nvSpPr>
-          <p:cNvPr id="3" name="Номер слайда 2"/>
-          <p:cNvSpPr>
-            <a:spLocks noGrp="1"/>
-          </p:cNvSpPr>
-          <p:nvPr>
-            <p:ph type="sldNum" sz="quarter" idx="12"/>
-          </p:nvPr>
-        </p:nvSpPr>
-        <p:spPr/>
-        <p:txBody>
-          <a:bodyPr/>
-          <a:lstStyle/>
-          <a:p>
-            <a:fld id="{856B8CD2-A8B3-41B0-B02C-5B2C28F6DA9C}" type="slidenum">
-              <a:rPr lang="ru-RU" smtClean="0"/>
-              <a:t>47</a:t>
-            </a:fld>
-            <a:endParaRPr lang="ru-RU"/>
-          </a:p>
-        </p:txBody>
-      </p:sp>
-      <p:sp>
-        <p:nvSpPr>
-          <p:cNvPr id="4" name="TextBox 3"/>
-          <p:cNvSpPr txBox="1"/>
-          <p:nvPr/>
-        </p:nvSpPr>
-        <p:spPr>
-          <a:xfrm>
-            <a:off x="323528" y="1844824"/>
-            <a:ext cx="8352928" cy="5139869"/>
-          </a:xfrm>
-          <a:prstGeom prst="rect">
-            <a:avLst/>
-          </a:prstGeom>
-          <a:noFill/>
-        </p:spPr>
-        <p:txBody>
-          <a:bodyPr wrap="square" rtlCol="0">
-            <a:spAutoFit/>
-          </a:bodyPr>
-          <a:lstStyle/>
-          <a:p>
-            <a:r>
-              <a:rPr lang="ru-RU" sz="3200" dirty="0"/>
-              <a:t>Потому что:</a:t>
-            </a:r>
-          </a:p>
-          <a:p>
-            <a:pPr marL="457200" indent="-457200">
-              <a:buFont typeface="Arial" pitchFamily="34" charset="0"/>
-              <a:buChar char="•"/>
-            </a:pPr>
-            <a:r>
-              <a:rPr lang="ru-RU" sz="3200" dirty="0" err="1"/>
-              <a:t>Тестировщик</a:t>
-            </a:r>
-            <a:r>
-              <a:rPr lang="ru-RU" sz="3200" dirty="0"/>
-              <a:t> умеет думать, а машина – </a:t>
-            </a:r>
-            <a:r>
-              <a:rPr lang="ru-RU" sz="3200" dirty="0" smtClean="0"/>
-              <a:t>выполнять</a:t>
-            </a:r>
-          </a:p>
-          <a:p>
-            <a:pPr marL="457200" indent="-457200">
-              <a:buFont typeface="Arial" pitchFamily="34" charset="0"/>
-              <a:buChar char="•"/>
-            </a:pPr>
-            <a:endParaRPr lang="ru-RU" sz="3200" dirty="0"/>
-          </a:p>
-          <a:p>
-            <a:pPr marL="457200" indent="-457200">
-              <a:buFont typeface="Arial" pitchFamily="34" charset="0"/>
-              <a:buChar char="•"/>
-            </a:pPr>
-            <a:r>
-              <a:rPr lang="ru-RU" sz="3200" dirty="0" err="1"/>
-              <a:t>Тестировщик</a:t>
-            </a:r>
-            <a:r>
-              <a:rPr lang="ru-RU" sz="3200" dirty="0"/>
-              <a:t> умеет тестировать, а машина – </a:t>
-            </a:r>
-            <a:r>
-              <a:rPr lang="ru-RU" sz="3200" dirty="0" smtClean="0"/>
-              <a:t>проверять</a:t>
-            </a:r>
-          </a:p>
-          <a:p>
-            <a:pPr marL="457200" indent="-457200">
-              <a:buFont typeface="Arial" pitchFamily="34" charset="0"/>
-              <a:buChar char="•"/>
-            </a:pPr>
-            <a:endParaRPr lang="ru-RU" sz="3200" dirty="0"/>
-          </a:p>
-          <a:p>
-            <a:pPr marL="457200" indent="-457200">
-              <a:buFont typeface="Arial" pitchFamily="34" charset="0"/>
-              <a:buChar char="•"/>
-            </a:pPr>
-            <a:r>
-              <a:rPr lang="ru-RU" sz="3200" dirty="0" err="1"/>
-              <a:t>Тестировщик</a:t>
-            </a:r>
-            <a:r>
-              <a:rPr lang="ru-RU" sz="3200" dirty="0"/>
-              <a:t> – это человек, а машина – это </a:t>
-            </a:r>
-            <a:r>
-              <a:rPr lang="ru-RU" sz="3200" dirty="0" smtClean="0"/>
-              <a:t>такая машина </a:t>
-            </a:r>
-            <a:r>
-              <a:rPr lang="ru-RU" sz="3200" dirty="0"/>
-              <a:t>;)</a:t>
-            </a:r>
-          </a:p>
-          <a:p>
-            <a:endParaRPr lang="ru-RU" sz="4000" dirty="0"/>
-          </a:p>
-        </p:txBody>
-      </p:sp>
-    </p:spTree>
-    <p:extLst>
-      <p:ext uri="{BB962C8B-B14F-4D97-AF65-F5344CB8AC3E}">
-        <p14:creationId xmlns:p14="http://schemas.microsoft.com/office/powerpoint/2010/main" val="3422890505"/>
-      </p:ext>
-    </p:extLst>
-  </p:cSld>
-  <p:clrMapOvr>
-    <a:masterClrMapping/>
-  </p:clrMapOvr>
-  <p:timing>
-    <p:tnLst>
-      <p:par>
-        <p:cTn id="1" dur="indefinite" restart="never" nodeType="tmRoot"/>
-      </p:par>
-    </p:tnLst>
-  </p:timing>
-</p:sld>
-</file>
-
-<file path=ppt/slides/slide48.xml><?xml version="1.0" encoding="utf-8"?>
-<p:sld xmlns:a="http://schemas.openxmlformats.org/drawingml/2006/main" xmlns:r="http://schemas.openxmlformats.org/officeDocument/2006/relationships" xmlns:p="http://schemas.openxmlformats.org/presentationml/2006/main">
-  <p:cSld>
-    <p:spTree>
-      <p:nvGrpSpPr>
-        <p:cNvPr id="1" name=""/>
-        <p:cNvGrpSpPr/>
-        <p:nvPr/>
-      </p:nvGrpSpPr>
-      <p:grpSpPr>
-        <a:xfrm>
-          <a:off x="0" y="0"/>
-          <a:ext cx="0" cy="0"/>
-          <a:chOff x="0" y="0"/>
-          <a:chExt cx="0" cy="0"/>
-        </a:xfrm>
-      </p:grpSpPr>
-      <p:sp>
-        <p:nvSpPr>
-          <p:cNvPr id="2" name="Заголовок 1"/>
-          <p:cNvSpPr>
-            <a:spLocks noGrp="1"/>
-          </p:cNvSpPr>
-          <p:nvPr>
-            <p:ph type="title"/>
-          </p:nvPr>
-        </p:nvSpPr>
-        <p:spPr/>
-        <p:txBody>
-          <a:bodyPr>
-            <a:normAutofit fontScale="90000"/>
-          </a:bodyPr>
-          <a:lstStyle/>
-          <a:p>
-            <a:r>
-              <a:rPr lang="ru-RU" dirty="0"/>
-              <a:t>Запускаемая спецификация не заменит всё-всё-всё</a:t>
-            </a:r>
-          </a:p>
-        </p:txBody>
-      </p:sp>
-      <p:sp>
-        <p:nvSpPr>
-          <p:cNvPr id="3" name="Номер слайда 2"/>
-          <p:cNvSpPr>
-            <a:spLocks noGrp="1"/>
-          </p:cNvSpPr>
-          <p:nvPr>
-            <p:ph type="sldNum" sz="quarter" idx="12"/>
-          </p:nvPr>
-        </p:nvSpPr>
-        <p:spPr/>
-        <p:txBody>
-          <a:bodyPr/>
-          <a:lstStyle/>
-          <a:p>
-            <a:fld id="{856B8CD2-A8B3-41B0-B02C-5B2C28F6DA9C}" type="slidenum">
-              <a:rPr lang="ru-RU" smtClean="0"/>
-              <a:t>48</a:t>
-            </a:fld>
-            <a:endParaRPr lang="ru-RU"/>
-          </a:p>
-        </p:txBody>
-      </p:sp>
-      <p:sp>
-        <p:nvSpPr>
-          <p:cNvPr id="4" name="TextBox 3"/>
-          <p:cNvSpPr txBox="1"/>
-          <p:nvPr/>
-        </p:nvSpPr>
-        <p:spPr>
-          <a:xfrm>
-            <a:off x="435444" y="2060848"/>
-            <a:ext cx="8720657" cy="3970318"/>
-          </a:xfrm>
-          <a:prstGeom prst="rect">
-            <a:avLst/>
-          </a:prstGeom>
-          <a:noFill/>
-        </p:spPr>
-        <p:txBody>
-          <a:bodyPr wrap="none" rtlCol="0">
-            <a:spAutoFit/>
-          </a:bodyPr>
-          <a:lstStyle/>
-          <a:p>
-            <a:pPr marL="457200" indent="-457200">
-              <a:buFont typeface="Arial" pitchFamily="34" charset="0"/>
-              <a:buChar char="•"/>
-            </a:pPr>
-            <a:r>
-              <a:rPr lang="ru-RU" sz="3200" dirty="0"/>
-              <a:t>Детали в переписке с </a:t>
-            </a:r>
-            <a:r>
-              <a:rPr lang="ru-RU" sz="3200" dirty="0" smtClean="0"/>
-              <a:t>заказчиками</a:t>
-            </a:r>
-          </a:p>
-          <a:p>
-            <a:pPr marL="171450" indent="-171450">
-              <a:buFont typeface="Arial" pitchFamily="34" charset="0"/>
-              <a:buChar char="•"/>
-            </a:pPr>
-            <a:endParaRPr lang="ru-RU" sz="1200" dirty="0"/>
-          </a:p>
-          <a:p>
-            <a:pPr marL="457200" indent="-457200">
-              <a:buFont typeface="Arial" pitchFamily="34" charset="0"/>
-              <a:buChar char="•"/>
-            </a:pPr>
-            <a:r>
-              <a:rPr lang="ru-RU" sz="3200" dirty="0"/>
-              <a:t>Информацию из баг-</a:t>
-            </a:r>
-            <a:r>
-              <a:rPr lang="ru-RU" sz="3200" dirty="0" err="1"/>
-              <a:t>треккера</a:t>
-            </a:r>
-            <a:r>
-              <a:rPr lang="ru-RU" sz="3200" dirty="0" smtClean="0"/>
-              <a:t>,</a:t>
-            </a:r>
-          </a:p>
-          <a:p>
-            <a:pPr marL="171450" indent="-171450">
-              <a:buFont typeface="Arial" pitchFamily="34" charset="0"/>
-              <a:buChar char="•"/>
-            </a:pPr>
-            <a:endParaRPr lang="ru-RU" sz="1200" dirty="0" smtClean="0"/>
-          </a:p>
-          <a:p>
-            <a:pPr marL="457200" indent="-457200">
-              <a:buFont typeface="Arial" pitchFamily="34" charset="0"/>
-              <a:buChar char="•"/>
-            </a:pPr>
-            <a:r>
-              <a:rPr lang="ru-RU" sz="3200" dirty="0" smtClean="0"/>
-              <a:t>Другая </a:t>
-            </a:r>
-            <a:r>
-              <a:rPr lang="ru-RU" sz="3200" dirty="0"/>
-              <a:t>проектная </a:t>
-            </a:r>
-            <a:r>
-              <a:rPr lang="ru-RU" sz="3200" dirty="0" smtClean="0"/>
-              <a:t>документация</a:t>
-            </a:r>
-          </a:p>
-          <a:p>
-            <a:pPr marL="171450" indent="-171450">
-              <a:buFont typeface="Arial" pitchFamily="34" charset="0"/>
-              <a:buChar char="•"/>
-            </a:pPr>
-            <a:endParaRPr lang="ru-RU" sz="1200" dirty="0" smtClean="0"/>
-          </a:p>
-          <a:p>
-            <a:pPr marL="457200" indent="-457200">
-              <a:buFont typeface="Arial" pitchFamily="34" charset="0"/>
-              <a:buChar char="•"/>
-            </a:pPr>
-            <a:r>
-              <a:rPr lang="ru-RU" sz="3200" dirty="0" smtClean="0"/>
-              <a:t>Диаграммы</a:t>
-            </a:r>
-            <a:r>
-              <a:rPr lang="ru-RU" sz="3200" dirty="0"/>
-              <a:t>, скриншоты, разговоры в </a:t>
-            </a:r>
-            <a:r>
-              <a:rPr lang="ru-RU" sz="3200" dirty="0" err="1" smtClean="0"/>
-              <a:t>Скайпе</a:t>
-            </a:r>
-            <a:endParaRPr lang="ru-RU" sz="3200" dirty="0" smtClean="0"/>
-          </a:p>
-          <a:p>
-            <a:pPr marL="171450" indent="-171450">
-              <a:buFont typeface="Arial" pitchFamily="34" charset="0"/>
-              <a:buChar char="•"/>
-            </a:pPr>
-            <a:endParaRPr lang="ru-RU" sz="1200" dirty="0" smtClean="0"/>
-          </a:p>
-          <a:p>
-            <a:pPr marL="457200" indent="-457200">
-              <a:buFont typeface="Arial" pitchFamily="34" charset="0"/>
-              <a:buChar char="•"/>
-            </a:pPr>
-            <a:r>
-              <a:rPr lang="ru-RU" sz="3200" dirty="0" smtClean="0"/>
-              <a:t>Другие </a:t>
-            </a:r>
-            <a:r>
-              <a:rPr lang="ru-RU" sz="3200" dirty="0"/>
-              <a:t>инструменты </a:t>
-            </a:r>
-            <a:r>
-              <a:rPr lang="ru-RU" sz="3200" dirty="0" smtClean="0"/>
-              <a:t>тестирования</a:t>
-            </a:r>
-          </a:p>
-          <a:p>
-            <a:pPr marL="171450" indent="-171450">
-              <a:buFont typeface="Arial" pitchFamily="34" charset="0"/>
-              <a:buChar char="•"/>
-            </a:pPr>
-            <a:endParaRPr lang="ru-RU" sz="1200" dirty="0" smtClean="0"/>
-          </a:p>
-          <a:p>
-            <a:pPr marL="457200" indent="-457200">
-              <a:buFont typeface="Arial" pitchFamily="34" charset="0"/>
-              <a:buChar char="•"/>
-            </a:pPr>
-            <a:r>
-              <a:rPr lang="ru-RU" sz="3200" dirty="0" smtClean="0"/>
-              <a:t>Все </a:t>
-            </a:r>
-            <a:r>
-              <a:rPr lang="ru-RU" sz="3200" dirty="0"/>
-              <a:t>другие мануальные </a:t>
-            </a:r>
-            <a:r>
-              <a:rPr lang="ru-RU" sz="3200" dirty="0" smtClean="0"/>
-              <a:t>тесты</a:t>
-            </a:r>
-            <a:endParaRPr lang="ru-RU" sz="3200" dirty="0"/>
-          </a:p>
-        </p:txBody>
-      </p:sp>
-    </p:spTree>
-    <p:extLst>
-      <p:ext uri="{BB962C8B-B14F-4D97-AF65-F5344CB8AC3E}">
-        <p14:creationId xmlns:p14="http://schemas.microsoft.com/office/powerpoint/2010/main" val="2828379568"/>
-      </p:ext>
-    </p:extLst>
-  </p:cSld>
-  <p:clrMapOvr>
-    <a:masterClrMapping/>
-  </p:clrMapOvr>
-  <p:timing>
-    <p:tnLst>
-      <p:par>
-        <p:cTn id="1" dur="indefinite" restart="never" nodeType="tmRoot"/>
-      </p:par>
-    </p:tnLst>
-  </p:timing>
-</p:sld>
-</file>
-
 <file path=ppt/slides/slide49.xml><?xml version="1.0" encoding="utf-8"?>
 <p:sld xmlns:a="http://schemas.openxmlformats.org/drawingml/2006/main" xmlns:r="http://schemas.openxmlformats.org/officeDocument/2006/relationships" xmlns:p="http://schemas.openxmlformats.org/presentationml/2006/main">
   <p:cSld>
@@ -18441,20 +18804,48 @@
         </p:nvSpPr>
         <p:spPr/>
         <p:txBody>
+          <a:bodyPr>
+            <a:normAutofit/>
+          </a:bodyPr>
+          <a:lstStyle/>
+          <a:p>
+            <a:r>
+              <a:rPr lang="ru-RU" dirty="0"/>
+              <a:t>Серебряной пули действительно </a:t>
+            </a:r>
+            <a:r>
+              <a:rPr lang="ru-RU" dirty="0" smtClean="0"/>
+              <a:t>нет</a:t>
+            </a:r>
+            <a:endParaRPr lang="ru-RU" dirty="0"/>
+          </a:p>
+        </p:txBody>
+      </p:sp>
+      <p:sp>
+        <p:nvSpPr>
+          <p:cNvPr id="3" name="Текст 2"/>
+          <p:cNvSpPr>
+            <a:spLocks noGrp="1"/>
+          </p:cNvSpPr>
+          <p:nvPr>
+            <p:ph type="body" idx="1"/>
+          </p:nvPr>
+        </p:nvSpPr>
+        <p:spPr/>
+        <p:txBody>
           <a:bodyPr/>
           <a:lstStyle/>
           <a:p>
             <a:r>
-              <a:rPr lang="ru-RU" dirty="0" smtClean="0"/>
-              <a:t>Зато помогает</a:t>
-            </a:r>
-            <a:endParaRPr lang="ru-RU" dirty="0"/>
-          </a:p>
-        </p:txBody>
-      </p:sp>
-      <p:sp>
-        <p:nvSpPr>
-          <p:cNvPr id="3" name="Номер слайда 2"/>
+              <a:rPr lang="ru-RU" dirty="0"/>
+              <a:t>Пока что…</a:t>
+            </a:r>
+          </a:p>
+        </p:txBody>
+      </p:sp>
+      <p:sp>
+        <p:nvSpPr>
+          <p:cNvPr id="4" name="Номер слайда 3"/>
           <p:cNvSpPr>
             <a:spLocks noGrp="1"/>
           </p:cNvSpPr>
@@ -18475,135 +18866,10 @@
           </a:p>
         </p:txBody>
       </p:sp>
-      <p:sp>
-        <p:nvSpPr>
-          <p:cNvPr id="4" name="TextBox 3"/>
-          <p:cNvSpPr txBox="1"/>
-          <p:nvPr/>
-        </p:nvSpPr>
-        <p:spPr>
-          <a:xfrm>
-            <a:off x="251520" y="1628800"/>
-            <a:ext cx="8712968" cy="4708981"/>
-          </a:xfrm>
-          <a:prstGeom prst="rect">
-            <a:avLst/>
-          </a:prstGeom>
-          <a:noFill/>
-        </p:spPr>
-        <p:txBody>
-          <a:bodyPr wrap="square" rtlCol="0">
-            <a:spAutoFit/>
-          </a:bodyPr>
-          <a:lstStyle/>
-          <a:p>
-            <a:pPr marL="457200" indent="-457200">
-              <a:buFont typeface="Arial" pitchFamily="34" charset="0"/>
-              <a:buChar char="•"/>
-            </a:pPr>
-            <a:r>
-              <a:rPr lang="ru-RU" sz="2800" dirty="0"/>
-              <a:t>Обсудить </a:t>
-            </a:r>
-            <a:r>
-              <a:rPr lang="ru-RU" sz="2800" dirty="0" smtClean="0"/>
-              <a:t>ожидания от  </a:t>
-            </a:r>
-            <a:r>
-              <a:rPr lang="ru-RU" sz="2800" dirty="0"/>
-              <a:t>реализации новой </a:t>
-            </a:r>
-            <a:r>
-              <a:rPr lang="ru-RU" sz="2800" dirty="0" smtClean="0"/>
-              <a:t>функциональности с коллегами</a:t>
-            </a:r>
-          </a:p>
-          <a:p>
-            <a:pPr marL="457200" indent="-457200">
-              <a:buFont typeface="Arial" pitchFamily="34" charset="0"/>
-              <a:buChar char="•"/>
-            </a:pPr>
-            <a:endParaRPr lang="ru-RU" sz="1200" dirty="0"/>
-          </a:p>
-          <a:p>
-            <a:pPr marL="457200" indent="-457200">
-              <a:buFont typeface="Arial" pitchFamily="34" charset="0"/>
-              <a:buChar char="•"/>
-            </a:pPr>
-            <a:r>
-              <a:rPr lang="ru-RU" sz="2800" dirty="0"/>
-              <a:t>Подкрепить требования примерами, тестами,  которые тестируют сами </a:t>
-            </a:r>
-            <a:r>
-              <a:rPr lang="ru-RU" sz="2800" dirty="0" smtClean="0"/>
-              <a:t>требования</a:t>
-            </a:r>
-          </a:p>
-          <a:p>
-            <a:pPr marL="457200" indent="-457200">
-              <a:buFont typeface="Arial" pitchFamily="34" charset="0"/>
-              <a:buChar char="•"/>
-            </a:pPr>
-            <a:endParaRPr lang="ru-RU" sz="1200" dirty="0"/>
-          </a:p>
-          <a:p>
-            <a:pPr marL="457200" indent="-457200">
-              <a:buFont typeface="Arial" pitchFamily="34" charset="0"/>
-              <a:buChar char="•"/>
-            </a:pPr>
-            <a:r>
-              <a:rPr lang="ru-RU" sz="2800" dirty="0"/>
-              <a:t>Создавать мануальные тест кейсы такими, чтобы их было легче </a:t>
-            </a:r>
-            <a:r>
-              <a:rPr lang="ru-RU" sz="2800" dirty="0" smtClean="0"/>
-              <a:t>автоматизировать</a:t>
-            </a:r>
-          </a:p>
-          <a:p>
-            <a:pPr marL="457200" indent="-457200">
-              <a:buFont typeface="Arial" pitchFamily="34" charset="0"/>
-              <a:buChar char="•"/>
-            </a:pPr>
-            <a:endParaRPr lang="ru-RU" sz="1200" dirty="0"/>
-          </a:p>
-          <a:p>
-            <a:pPr marL="457200" indent="-457200">
-              <a:buFont typeface="Arial" pitchFamily="34" charset="0"/>
-              <a:buChar char="•"/>
-            </a:pPr>
-            <a:r>
-              <a:rPr lang="ru-RU" sz="2800" dirty="0"/>
-              <a:t>Автоматизировать регрессионное </a:t>
-            </a:r>
-            <a:r>
-              <a:rPr lang="ru-RU" sz="2800" dirty="0" smtClean="0"/>
-              <a:t>тестирование</a:t>
-            </a:r>
-          </a:p>
-          <a:p>
-            <a:pPr marL="457200" indent="-457200">
-              <a:buFont typeface="Arial" pitchFamily="34" charset="0"/>
-              <a:buChar char="•"/>
-            </a:pPr>
-            <a:endParaRPr lang="ru-RU" sz="1200" dirty="0"/>
-          </a:p>
-          <a:p>
-            <a:pPr marL="457200" indent="-457200">
-              <a:buFont typeface="Arial" pitchFamily="34" charset="0"/>
-              <a:buChar char="•"/>
-            </a:pPr>
-            <a:r>
-              <a:rPr lang="ru-RU" sz="2800" dirty="0"/>
-              <a:t>Документировать новые знания и другую информацию о системе</a:t>
-            </a:r>
-          </a:p>
-        </p:txBody>
-      </p:sp>
     </p:spTree>
     <p:extLst>
       <p:ext uri="{BB962C8B-B14F-4D97-AF65-F5344CB8AC3E}">
-        <p14:creationId xmlns:p14="http://schemas.microsoft.com/office/powerpoint/2010/main" val="3552213914"/>
+        <p14:creationId xmlns:p14="http://schemas.microsoft.com/office/powerpoint/2010/main" val="3334280742"/>
       </p:ext>
     </p:extLst>
   </p:cSld>
@@ -18830,12 +19096,18 @@
         </p:nvSpPr>
         <p:spPr/>
         <p:txBody>
-          <a:bodyPr/>
+          <a:bodyPr>
+            <a:normAutofit fontScale="90000"/>
+          </a:bodyPr>
           <a:lstStyle/>
           <a:p>
             <a:r>
-              <a:rPr lang="ru-RU" dirty="0" smtClean="0"/>
-              <a:t>В автоматизации тестирования</a:t>
+              <a:rPr lang="ru-RU" dirty="0"/>
+              <a:t>Автоматизация не заменит </a:t>
+            </a:r>
+            <a:r>
+              <a:rPr lang="ru-RU" dirty="0" err="1"/>
+              <a:t>тестировщика</a:t>
             </a:r>
             <a:endParaRPr lang="ru-RU" dirty="0"/>
           </a:p>
@@ -18872,8 +19144,8 @@
         </p:nvSpPr>
         <p:spPr>
           <a:xfrm>
-            <a:off x="539552" y="1988840"/>
-            <a:ext cx="7992888" cy="4031873"/>
+            <a:off x="323528" y="1844824"/>
+            <a:ext cx="8352928" cy="5139869"/>
           </a:xfrm>
           <a:prstGeom prst="rect">
             <a:avLst/>
@@ -18886,56 +19158,92 @@
           </a:bodyPr>
           <a:lstStyle/>
           <a:p>
-            <a:pPr marL="285750" indent="-285750">
+            <a:r>
+              <a:rPr lang="ru-RU" sz="3200" dirty="0"/>
+              <a:t>Потому что:</a:t>
+            </a:r>
+          </a:p>
+          <a:p>
+            <a:pPr marL="457200" indent="-457200">
               <a:buFont typeface="Arial" pitchFamily="34" charset="0"/>
               <a:buChar char="•"/>
             </a:pPr>
             <a:r>
+              <a:rPr lang="ru-RU" sz="3200" dirty="0" err="1"/>
+              <a:t>Тестировщик</a:t>
+            </a:r>
+            <a:r>
+              <a:rPr lang="ru-RU" sz="3200" dirty="0"/>
+              <a:t> умеет думать, а машина – </a:t>
+            </a:r>
+            <a:r>
               <a:rPr lang="ru-RU" sz="3200" dirty="0" smtClean="0"/>
-              <a:t>Помогает сделать сложный тест более читабельным и понятным</a:t>
-            </a:r>
-          </a:p>
-          <a:p>
-            <a:pPr marL="285750" indent="-285750">
+              <a:t>выполнять</a:t>
+            </a:r>
+          </a:p>
+          <a:p>
+            <a:pPr marL="457200" indent="-457200">
               <a:buFont typeface="Arial" pitchFamily="34" charset="0"/>
               <a:buChar char="•"/>
             </a:pPr>
-            <a:endParaRPr lang="ru-RU" sz="3200" dirty="0" smtClean="0"/>
-          </a:p>
-          <a:p>
-            <a:pPr marL="285750" indent="-285750">
+            <a:endParaRPr lang="ru-RU" sz="3200" dirty="0"/>
+          </a:p>
+          <a:p>
+            <a:pPr marL="457200" indent="-457200">
               <a:buFont typeface="Arial" pitchFamily="34" charset="0"/>
               <a:buChar char="•"/>
             </a:pPr>
             <a:r>
+              <a:rPr lang="ru-RU" sz="3200" dirty="0" err="1"/>
+              <a:t>Тестировщик</a:t>
+            </a:r>
+            <a:r>
+              <a:rPr lang="ru-RU" sz="3200" dirty="0"/>
+              <a:t> умеет тестировать, а машина – </a:t>
+            </a:r>
+            <a:r>
               <a:rPr lang="ru-RU" sz="3200" dirty="0" smtClean="0"/>
-              <a:t>Обеспечивает внешний пользовательский интерфейс для теста</a:t>
-            </a:r>
-          </a:p>
-          <a:p>
-            <a:pPr marL="285750" indent="-285750">
+              <a:t>проверять</a:t>
+            </a:r>
+          </a:p>
+          <a:p>
+            <a:pPr marL="457200" indent="-457200">
               <a:buFont typeface="Arial" pitchFamily="34" charset="0"/>
               <a:buChar char="•"/>
             </a:pPr>
-            <a:endParaRPr lang="ru-RU" sz="3200" dirty="0" smtClean="0"/>
-          </a:p>
-          <a:p>
-            <a:pPr marL="285750" indent="-285750">
+            <a:endParaRPr lang="ru-RU" sz="3200" dirty="0"/>
+          </a:p>
+          <a:p>
+            <a:pPr marL="457200" indent="-457200">
               <a:buFont typeface="Arial" pitchFamily="34" charset="0"/>
               <a:buChar char="•"/>
             </a:pPr>
             <a:r>
+              <a:rPr lang="ru-RU" sz="3200" dirty="0" err="1"/>
+              <a:t>Тестировщик</a:t>
+            </a:r>
+            <a:r>
+              <a:rPr lang="ru-RU" sz="3200" dirty="0"/>
+              <a:t> – это человек, а машина – это </a:t>
+            </a:r>
+            <a:r>
               <a:rPr lang="ru-RU" sz="3200" dirty="0" smtClean="0"/>
-              <a:t>Помогает разбить один большой тест на повторно используемые блоки</a:t>
-            </a:r>
-            <a:endParaRPr lang="ru-RU" sz="3200" dirty="0"/>
+              <a:t>такая машина </a:t>
+            </a:r>
+            <a:r>
+              <a:rPr lang="ru-RU" sz="3200" dirty="0"/>
+              <a:t>;)</a:t>
+            </a:r>
+          </a:p>
+          <a:p>
+            <a:endParaRPr lang="ru-RU" sz="4000" dirty="0"/>
           </a:p>
         </p:txBody>
       </p:sp>
     </p:spTree>
     <p:extLst>
       <p:ext uri="{BB962C8B-B14F-4D97-AF65-F5344CB8AC3E}">
-        <p14:creationId xmlns:p14="http://schemas.microsoft.com/office/powerpoint/2010/main" val="654872594"/>
+        <p14:creationId xmlns:p14="http://schemas.microsoft.com/office/powerpoint/2010/main" val="3422890505"/>
       </p:ext>
     </p:extLst>
   </p:cSld>
@@ -18981,14 +19289,15 @@
         </p:nvSpPr>
         <p:spPr/>
         <p:txBody>
-          <a:bodyPr/>
+          <a:bodyPr>
+            <a:normAutofit fontScale="90000"/>
+          </a:bodyPr>
           <a:lstStyle/>
           <a:p>
             <a:r>
-              <a:rPr lang="ru-RU" dirty="0" smtClean="0"/>
-              <a:t>Но, не лечит всю автоматизацию</a:t>
-            </a:r>
-            <a:endParaRPr lang="ru-RU" dirty="0"/>
+              <a:rPr lang="ru-RU" dirty="0"/>
+              <a:t>Запускаемая спецификация не заменит всё-всё-всё</a:t>
+            </a:r>
           </a:p>
         </p:txBody>
       </p:sp>
@@ -19010,6 +19319,612 @@
             <a:fld id="{856B8CD2-A8B3-41B0-B02C-5B2C28F6DA9C}" type="slidenum">
               <a:rPr lang="ru-RU" smtClean="0"/>
               <a:t>51</a:t>
+            </a:fld>
+            <a:endParaRPr lang="ru-RU"/>
+          </a:p>
+        </p:txBody>
+      </p:sp>
+      <p:sp>
+        <p:nvSpPr>
+          <p:cNvPr id="4" name="TextBox 3"/>
+          <p:cNvSpPr txBox="1"/>
+          <p:nvPr/>
+        </p:nvSpPr>
+        <p:spPr>
+          <a:xfrm>
+            <a:off x="435444" y="2060848"/>
+            <a:ext cx="8720657" cy="3970318"/>
+          </a:xfrm>
+          <a:prstGeom prst="rect">
+            <a:avLst/>
+          </a:prstGeom>
+          <a:noFill/>
+        </p:spPr>
+        <p:txBody>
+          <a:bodyPr wrap="none" rtlCol="0">
+            <a:spAutoFit/>
+          </a:bodyPr>
+          <a:lstStyle/>
+          <a:p>
+            <a:pPr marL="457200" indent="-457200">
+              <a:buFont typeface="Arial" pitchFamily="34" charset="0"/>
+              <a:buChar char="•"/>
+            </a:pPr>
+            <a:r>
+              <a:rPr lang="ru-RU" sz="3200" dirty="0"/>
+              <a:t>Детали в переписке с </a:t>
+            </a:r>
+            <a:r>
+              <a:rPr lang="ru-RU" sz="3200" dirty="0" smtClean="0"/>
+              <a:t>заказчиками</a:t>
+            </a:r>
+          </a:p>
+          <a:p>
+            <a:pPr marL="171450" indent="-171450">
+              <a:buFont typeface="Arial" pitchFamily="34" charset="0"/>
+              <a:buChar char="•"/>
+            </a:pPr>
+            <a:endParaRPr lang="ru-RU" sz="1200" dirty="0"/>
+          </a:p>
+          <a:p>
+            <a:pPr marL="457200" indent="-457200">
+              <a:buFont typeface="Arial" pitchFamily="34" charset="0"/>
+              <a:buChar char="•"/>
+            </a:pPr>
+            <a:r>
+              <a:rPr lang="ru-RU" sz="3200" dirty="0"/>
+              <a:t>Информацию из баг-</a:t>
+            </a:r>
+            <a:r>
+              <a:rPr lang="ru-RU" sz="3200" dirty="0" err="1"/>
+              <a:t>треккера</a:t>
+            </a:r>
+            <a:r>
+              <a:rPr lang="ru-RU" sz="3200" dirty="0" smtClean="0"/>
+              <a:t>,</a:t>
+            </a:r>
+          </a:p>
+          <a:p>
+            <a:pPr marL="171450" indent="-171450">
+              <a:buFont typeface="Arial" pitchFamily="34" charset="0"/>
+              <a:buChar char="•"/>
+            </a:pPr>
+            <a:endParaRPr lang="ru-RU" sz="1200" dirty="0" smtClean="0"/>
+          </a:p>
+          <a:p>
+            <a:pPr marL="457200" indent="-457200">
+              <a:buFont typeface="Arial" pitchFamily="34" charset="0"/>
+              <a:buChar char="•"/>
+            </a:pPr>
+            <a:r>
+              <a:rPr lang="ru-RU" sz="3200" dirty="0" smtClean="0"/>
+              <a:t>Другая </a:t>
+            </a:r>
+            <a:r>
+              <a:rPr lang="ru-RU" sz="3200" dirty="0"/>
+              <a:t>проектная </a:t>
+            </a:r>
+            <a:r>
+              <a:rPr lang="ru-RU" sz="3200" dirty="0" smtClean="0"/>
+              <a:t>документация</a:t>
+            </a:r>
+          </a:p>
+          <a:p>
+            <a:pPr marL="171450" indent="-171450">
+              <a:buFont typeface="Arial" pitchFamily="34" charset="0"/>
+              <a:buChar char="•"/>
+            </a:pPr>
+            <a:endParaRPr lang="ru-RU" sz="1200" dirty="0" smtClean="0"/>
+          </a:p>
+          <a:p>
+            <a:pPr marL="457200" indent="-457200">
+              <a:buFont typeface="Arial" pitchFamily="34" charset="0"/>
+              <a:buChar char="•"/>
+            </a:pPr>
+            <a:r>
+              <a:rPr lang="ru-RU" sz="3200" dirty="0" smtClean="0"/>
+              <a:t>Диаграммы</a:t>
+            </a:r>
+            <a:r>
+              <a:rPr lang="ru-RU" sz="3200" dirty="0"/>
+              <a:t>, скриншоты, разговоры в </a:t>
+            </a:r>
+            <a:r>
+              <a:rPr lang="ru-RU" sz="3200" dirty="0" err="1" smtClean="0"/>
+              <a:t>Скайпе</a:t>
+            </a:r>
+            <a:endParaRPr lang="ru-RU" sz="3200" dirty="0" smtClean="0"/>
+          </a:p>
+          <a:p>
+            <a:pPr marL="171450" indent="-171450">
+              <a:buFont typeface="Arial" pitchFamily="34" charset="0"/>
+              <a:buChar char="•"/>
+            </a:pPr>
+            <a:endParaRPr lang="ru-RU" sz="1200" dirty="0" smtClean="0"/>
+          </a:p>
+          <a:p>
+            <a:pPr marL="457200" indent="-457200">
+              <a:buFont typeface="Arial" pitchFamily="34" charset="0"/>
+              <a:buChar char="•"/>
+            </a:pPr>
+            <a:r>
+              <a:rPr lang="ru-RU" sz="3200" dirty="0" smtClean="0"/>
+              <a:t>Другие </a:t>
+            </a:r>
+            <a:r>
+              <a:rPr lang="ru-RU" sz="3200" dirty="0"/>
+              <a:t>инструменты </a:t>
+            </a:r>
+            <a:r>
+              <a:rPr lang="ru-RU" sz="3200" dirty="0" smtClean="0"/>
+              <a:t>тестирования</a:t>
+            </a:r>
+          </a:p>
+          <a:p>
+            <a:pPr marL="171450" indent="-171450">
+              <a:buFont typeface="Arial" pitchFamily="34" charset="0"/>
+              <a:buChar char="•"/>
+            </a:pPr>
+            <a:endParaRPr lang="ru-RU" sz="1200" dirty="0" smtClean="0"/>
+          </a:p>
+          <a:p>
+            <a:pPr marL="457200" indent="-457200">
+              <a:buFont typeface="Arial" pitchFamily="34" charset="0"/>
+              <a:buChar char="•"/>
+            </a:pPr>
+            <a:r>
+              <a:rPr lang="ru-RU" sz="3200" dirty="0" smtClean="0"/>
+              <a:t>Все </a:t>
+            </a:r>
+            <a:r>
+              <a:rPr lang="ru-RU" sz="3200" dirty="0"/>
+              <a:t>другие мануальные </a:t>
+            </a:r>
+            <a:r>
+              <a:rPr lang="ru-RU" sz="3200" dirty="0" smtClean="0"/>
+              <a:t>тесты</a:t>
+            </a:r>
+            <a:endParaRPr lang="ru-RU" sz="3200" dirty="0"/>
+          </a:p>
+        </p:txBody>
+      </p:sp>
+    </p:spTree>
+    <p:extLst>
+      <p:ext uri="{BB962C8B-B14F-4D97-AF65-F5344CB8AC3E}">
+        <p14:creationId xmlns:p14="http://schemas.microsoft.com/office/powerpoint/2010/main" val="2828379568"/>
+      </p:ext>
+    </p:extLst>
+  </p:cSld>
+  <p:clrMapOvr>
+    <a:masterClrMapping/>
+  </p:clrMapOvr>
+  <p:timing>
+    <p:tnLst>
+      <p:par>
+        <p:cTn id="1" dur="indefinite" restart="never" nodeType="tmRoot"/>
+      </p:par>
+    </p:tnLst>
+  </p:timing>
+</p:sld>
+</file>
+
+<file path=ppt/slides/slide52.xml><?xml version="1.0" encoding="utf-8"?>
+<p:sld xmlns:a="http://schemas.openxmlformats.org/drawingml/2006/main" xmlns:r="http://schemas.openxmlformats.org/officeDocument/2006/relationships" xmlns:p="http://schemas.openxmlformats.org/presentationml/2006/main">
+  <p:cSld>
+    <p:spTree>
+      <p:nvGrpSpPr>
+        <p:cNvPr id="1" name=""/>
+        <p:cNvGrpSpPr/>
+        <p:nvPr/>
+      </p:nvGrpSpPr>
+      <p:grpSpPr>
+        <a:xfrm>
+          <a:off x="0" y="0"/>
+          <a:ext cx="0" cy="0"/>
+          <a:chOff x="0" y="0"/>
+          <a:chExt cx="0" cy="0"/>
+        </a:xfrm>
+      </p:grpSpPr>
+      <p:sp>
+        <p:nvSpPr>
+          <p:cNvPr id="2" name="Заголовок 1"/>
+          <p:cNvSpPr>
+            <a:spLocks noGrp="1"/>
+          </p:cNvSpPr>
+          <p:nvPr>
+            <p:ph type="title"/>
+          </p:nvPr>
+        </p:nvSpPr>
+        <p:spPr/>
+        <p:txBody>
+          <a:bodyPr/>
+          <a:lstStyle/>
+          <a:p>
+            <a:r>
+              <a:rPr lang="ru-RU" dirty="0" smtClean="0"/>
+              <a:t>Зато помогает</a:t>
+            </a:r>
+            <a:endParaRPr lang="ru-RU" dirty="0"/>
+          </a:p>
+        </p:txBody>
+      </p:sp>
+      <p:sp>
+        <p:nvSpPr>
+          <p:cNvPr id="3" name="Номер слайда 2"/>
+          <p:cNvSpPr>
+            <a:spLocks noGrp="1"/>
+          </p:cNvSpPr>
+          <p:nvPr>
+            <p:ph type="sldNum" sz="quarter" idx="12"/>
+          </p:nvPr>
+        </p:nvSpPr>
+        <p:spPr/>
+        <p:txBody>
+          <a:bodyPr/>
+          <a:lstStyle/>
+          <a:p>
+            <a:fld id="{856B8CD2-A8B3-41B0-B02C-5B2C28F6DA9C}" type="slidenum">
+              <a:rPr lang="ru-RU" smtClean="0"/>
+              <a:t>52</a:t>
+            </a:fld>
+            <a:endParaRPr lang="ru-RU"/>
+          </a:p>
+        </p:txBody>
+      </p:sp>
+      <p:sp>
+        <p:nvSpPr>
+          <p:cNvPr id="4" name="TextBox 3"/>
+          <p:cNvSpPr txBox="1"/>
+          <p:nvPr/>
+        </p:nvSpPr>
+        <p:spPr>
+          <a:xfrm>
+            <a:off x="251520" y="1628800"/>
+            <a:ext cx="8712968" cy="4708981"/>
+          </a:xfrm>
+          <a:prstGeom prst="rect">
+            <a:avLst/>
+          </a:prstGeom>
+          <a:noFill/>
+        </p:spPr>
+        <p:txBody>
+          <a:bodyPr wrap="square" rtlCol="0">
+            <a:spAutoFit/>
+          </a:bodyPr>
+          <a:lstStyle/>
+          <a:p>
+            <a:pPr marL="457200" indent="-457200">
+              <a:buFont typeface="Arial" pitchFamily="34" charset="0"/>
+              <a:buChar char="•"/>
+            </a:pPr>
+            <a:r>
+              <a:rPr lang="ru-RU" sz="2800" dirty="0"/>
+              <a:t>Обсудить </a:t>
+            </a:r>
+            <a:r>
+              <a:rPr lang="ru-RU" sz="2800" dirty="0" smtClean="0"/>
+              <a:t>ожидания от  </a:t>
+            </a:r>
+            <a:r>
+              <a:rPr lang="ru-RU" sz="2800" dirty="0"/>
+              <a:t>реализации новой </a:t>
+            </a:r>
+            <a:r>
+              <a:rPr lang="ru-RU" sz="2800" dirty="0" smtClean="0"/>
+              <a:t>функциональности с коллегами</a:t>
+            </a:r>
+          </a:p>
+          <a:p>
+            <a:pPr marL="457200" indent="-457200">
+              <a:buFont typeface="Arial" pitchFamily="34" charset="0"/>
+              <a:buChar char="•"/>
+            </a:pPr>
+            <a:endParaRPr lang="ru-RU" sz="1200" dirty="0"/>
+          </a:p>
+          <a:p>
+            <a:pPr marL="457200" indent="-457200">
+              <a:buFont typeface="Arial" pitchFamily="34" charset="0"/>
+              <a:buChar char="•"/>
+            </a:pPr>
+            <a:r>
+              <a:rPr lang="ru-RU" sz="2800" dirty="0"/>
+              <a:t>Подкрепить требования примерами, тестами,  которые тестируют сами </a:t>
+            </a:r>
+            <a:r>
+              <a:rPr lang="ru-RU" sz="2800" dirty="0" smtClean="0"/>
+              <a:t>требования</a:t>
+            </a:r>
+          </a:p>
+          <a:p>
+            <a:pPr marL="457200" indent="-457200">
+              <a:buFont typeface="Arial" pitchFamily="34" charset="0"/>
+              <a:buChar char="•"/>
+            </a:pPr>
+            <a:endParaRPr lang="ru-RU" sz="1200" dirty="0"/>
+          </a:p>
+          <a:p>
+            <a:pPr marL="457200" indent="-457200">
+              <a:buFont typeface="Arial" pitchFamily="34" charset="0"/>
+              <a:buChar char="•"/>
+            </a:pPr>
+            <a:r>
+              <a:rPr lang="ru-RU" sz="2800" dirty="0"/>
+              <a:t>Создавать мануальные тест кейсы такими, чтобы их было легче </a:t>
+            </a:r>
+            <a:r>
+              <a:rPr lang="ru-RU" sz="2800" dirty="0" smtClean="0"/>
+              <a:t>автоматизировать</a:t>
+            </a:r>
+          </a:p>
+          <a:p>
+            <a:pPr marL="457200" indent="-457200">
+              <a:buFont typeface="Arial" pitchFamily="34" charset="0"/>
+              <a:buChar char="•"/>
+            </a:pPr>
+            <a:endParaRPr lang="ru-RU" sz="1200" dirty="0"/>
+          </a:p>
+          <a:p>
+            <a:pPr marL="457200" indent="-457200">
+              <a:buFont typeface="Arial" pitchFamily="34" charset="0"/>
+              <a:buChar char="•"/>
+            </a:pPr>
+            <a:r>
+              <a:rPr lang="ru-RU" sz="2800" dirty="0"/>
+              <a:t>Автоматизировать регрессионное </a:t>
+            </a:r>
+            <a:r>
+              <a:rPr lang="ru-RU" sz="2800" dirty="0" smtClean="0"/>
+              <a:t>тестирование</a:t>
+            </a:r>
+          </a:p>
+          <a:p>
+            <a:pPr marL="457200" indent="-457200">
+              <a:buFont typeface="Arial" pitchFamily="34" charset="0"/>
+              <a:buChar char="•"/>
+            </a:pPr>
+            <a:endParaRPr lang="ru-RU" sz="1200" dirty="0"/>
+          </a:p>
+          <a:p>
+            <a:pPr marL="457200" indent="-457200">
+              <a:buFont typeface="Arial" pitchFamily="34" charset="0"/>
+              <a:buChar char="•"/>
+            </a:pPr>
+            <a:r>
+              <a:rPr lang="ru-RU" sz="2800" dirty="0"/>
+              <a:t>Документировать новые знания и другую информацию о системе</a:t>
+            </a:r>
+          </a:p>
+        </p:txBody>
+      </p:sp>
+    </p:spTree>
+    <p:extLst>
+      <p:ext uri="{BB962C8B-B14F-4D97-AF65-F5344CB8AC3E}">
+        <p14:creationId xmlns:p14="http://schemas.microsoft.com/office/powerpoint/2010/main" val="3552213914"/>
+      </p:ext>
+    </p:extLst>
+  </p:cSld>
+  <p:clrMapOvr>
+    <a:masterClrMapping/>
+  </p:clrMapOvr>
+  <p:timing>
+    <p:tnLst>
+      <p:par>
+        <p:cTn id="1" dur="indefinite" restart="never" nodeType="tmRoot"/>
+      </p:par>
+    </p:tnLst>
+  </p:timing>
+</p:sld>
+</file>
+
+<file path=ppt/slides/slide53.xml><?xml version="1.0" encoding="utf-8"?>
+<p:sld xmlns:a="http://schemas.openxmlformats.org/drawingml/2006/main" xmlns:r="http://schemas.openxmlformats.org/officeDocument/2006/relationships" xmlns:p="http://schemas.openxmlformats.org/presentationml/2006/main">
+  <p:cSld>
+    <p:spTree>
+      <p:nvGrpSpPr>
+        <p:cNvPr id="1" name=""/>
+        <p:cNvGrpSpPr/>
+        <p:nvPr/>
+      </p:nvGrpSpPr>
+      <p:grpSpPr>
+        <a:xfrm>
+          <a:off x="0" y="0"/>
+          <a:ext cx="0" cy="0"/>
+          <a:chOff x="0" y="0"/>
+          <a:chExt cx="0" cy="0"/>
+        </a:xfrm>
+      </p:grpSpPr>
+      <p:sp>
+        <p:nvSpPr>
+          <p:cNvPr id="2" name="Заголовок 1"/>
+          <p:cNvSpPr>
+            <a:spLocks noGrp="1"/>
+          </p:cNvSpPr>
+          <p:nvPr>
+            <p:ph type="title"/>
+          </p:nvPr>
+        </p:nvSpPr>
+        <p:spPr/>
+        <p:txBody>
+          <a:bodyPr/>
+          <a:lstStyle/>
+          <a:p>
+            <a:r>
+              <a:rPr lang="ru-RU" dirty="0" smtClean="0"/>
+              <a:t>В автоматизации тестирования</a:t>
+            </a:r>
+            <a:endParaRPr lang="ru-RU" dirty="0"/>
+          </a:p>
+        </p:txBody>
+      </p:sp>
+      <p:sp>
+        <p:nvSpPr>
+          <p:cNvPr id="3" name="Номер слайда 2"/>
+          <p:cNvSpPr>
+            <a:spLocks noGrp="1"/>
+          </p:cNvSpPr>
+          <p:nvPr>
+            <p:ph type="sldNum" sz="quarter" idx="12"/>
+          </p:nvPr>
+        </p:nvSpPr>
+        <p:spPr/>
+        <p:txBody>
+          <a:bodyPr/>
+          <a:lstStyle/>
+          <a:p>
+            <a:fld id="{856B8CD2-A8B3-41B0-B02C-5B2C28F6DA9C}" type="slidenum">
+              <a:rPr lang="ru-RU" smtClean="0"/>
+              <a:t>53</a:t>
+            </a:fld>
+            <a:endParaRPr lang="ru-RU"/>
+          </a:p>
+        </p:txBody>
+      </p:sp>
+      <p:sp>
+        <p:nvSpPr>
+          <p:cNvPr id="4" name="TextBox 3"/>
+          <p:cNvSpPr txBox="1"/>
+          <p:nvPr/>
+        </p:nvSpPr>
+        <p:spPr>
+          <a:xfrm>
+            <a:off x="539552" y="1988840"/>
+            <a:ext cx="7992888" cy="4031873"/>
+          </a:xfrm>
+          <a:prstGeom prst="rect">
+            <a:avLst/>
+          </a:prstGeom>
+          <a:noFill/>
+        </p:spPr>
+        <p:txBody>
+          <a:bodyPr wrap="square" rtlCol="0">
+            <a:spAutoFit/>
+          </a:bodyPr>
+          <a:lstStyle/>
+          <a:p>
+            <a:pPr marL="285750" indent="-285750">
+              <a:buFont typeface="Arial" pitchFamily="34" charset="0"/>
+              <a:buChar char="•"/>
+            </a:pPr>
+            <a:r>
+              <a:rPr lang="ru-RU" sz="3200" dirty="0" smtClean="0"/>
+              <a:t>Помогает сделать сложный тест более читабельным и понятным</a:t>
+            </a:r>
+          </a:p>
+          <a:p>
+            <a:pPr marL="285750" indent="-285750">
+              <a:buFont typeface="Arial" pitchFamily="34" charset="0"/>
+              <a:buChar char="•"/>
+            </a:pPr>
+            <a:endParaRPr lang="ru-RU" sz="3200" dirty="0" smtClean="0"/>
+          </a:p>
+          <a:p>
+            <a:pPr marL="285750" indent="-285750">
+              <a:buFont typeface="Arial" pitchFamily="34" charset="0"/>
+              <a:buChar char="•"/>
+            </a:pPr>
+            <a:r>
+              <a:rPr lang="ru-RU" sz="3200" dirty="0" smtClean="0"/>
+              <a:t>Обеспечивает внешний пользовательский интерфейс для теста</a:t>
+            </a:r>
+          </a:p>
+          <a:p>
+            <a:pPr marL="285750" indent="-285750">
+              <a:buFont typeface="Arial" pitchFamily="34" charset="0"/>
+              <a:buChar char="•"/>
+            </a:pPr>
+            <a:endParaRPr lang="ru-RU" sz="3200" dirty="0" smtClean="0"/>
+          </a:p>
+          <a:p>
+            <a:pPr marL="285750" indent="-285750">
+              <a:buFont typeface="Arial" pitchFamily="34" charset="0"/>
+              <a:buChar char="•"/>
+            </a:pPr>
+            <a:r>
+              <a:rPr lang="ru-RU" sz="3200" dirty="0" smtClean="0"/>
+              <a:t>Помогает разбить один большой тест на повторно используемые блоки</a:t>
+            </a:r>
+            <a:endParaRPr lang="ru-RU" sz="3200" dirty="0"/>
+          </a:p>
+        </p:txBody>
+      </p:sp>
+    </p:spTree>
+    <p:extLst>
+      <p:ext uri="{BB962C8B-B14F-4D97-AF65-F5344CB8AC3E}">
+        <p14:creationId xmlns:p14="http://schemas.microsoft.com/office/powerpoint/2010/main" val="654872594"/>
+      </p:ext>
+    </p:extLst>
+  </p:cSld>
+  <p:clrMapOvr>
+    <a:masterClrMapping/>
+  </p:clrMapOvr>
+  <p:timing>
+    <p:tnLst>
+      <p:par>
+        <p:cTn id="1" dur="indefinite" restart="never" nodeType="tmRoot"/>
+      </p:par>
+    </p:tnLst>
+  </p:timing>
+</p:sld>
+</file>
+
+<file path=ppt/slides/slide54.xml><?xml version="1.0" encoding="utf-8"?>
+<p:sld xmlns:a="http://schemas.openxmlformats.org/drawingml/2006/main" xmlns:r="http://schemas.openxmlformats.org/officeDocument/2006/relationships" xmlns:p="http://schemas.openxmlformats.org/presentationml/2006/main">
+  <p:cSld>
+    <p:spTree>
+      <p:nvGrpSpPr>
+        <p:cNvPr id="1" name=""/>
+        <p:cNvGrpSpPr/>
+        <p:nvPr/>
+      </p:nvGrpSpPr>
+      <p:grpSpPr>
+        <a:xfrm>
+          <a:off x="0" y="0"/>
+          <a:ext cx="0" cy="0"/>
+          <a:chOff x="0" y="0"/>
+          <a:chExt cx="0" cy="0"/>
+        </a:xfrm>
+      </p:grpSpPr>
+      <p:sp>
+        <p:nvSpPr>
+          <p:cNvPr id="2" name="Заголовок 1"/>
+          <p:cNvSpPr>
+            <a:spLocks noGrp="1"/>
+          </p:cNvSpPr>
+          <p:nvPr>
+            <p:ph type="title"/>
+          </p:nvPr>
+        </p:nvSpPr>
+        <p:spPr/>
+        <p:txBody>
+          <a:bodyPr/>
+          <a:lstStyle/>
+          <a:p>
+            <a:r>
+              <a:rPr lang="ru-RU" dirty="0" smtClean="0"/>
+              <a:t>Но, не лечит всю автоматизацию</a:t>
+            </a:r>
+            <a:endParaRPr lang="ru-RU" dirty="0"/>
+          </a:p>
+        </p:txBody>
+      </p:sp>
+      <p:sp>
+        <p:nvSpPr>
+          <p:cNvPr id="3" name="Номер слайда 2"/>
+          <p:cNvSpPr>
+            <a:spLocks noGrp="1"/>
+          </p:cNvSpPr>
+          <p:nvPr>
+            <p:ph type="sldNum" sz="quarter" idx="12"/>
+          </p:nvPr>
+        </p:nvSpPr>
+        <p:spPr/>
+        <p:txBody>
+          <a:bodyPr/>
+          <a:lstStyle/>
+          <a:p>
+            <a:fld id="{856B8CD2-A8B3-41B0-B02C-5B2C28F6DA9C}" type="slidenum">
+              <a:rPr lang="ru-RU" smtClean="0"/>
+              <a:t>54</a:t>
             </a:fld>
             <a:endParaRPr lang="ru-RU"/>
           </a:p>
@@ -19076,7 +19991,7 @@
 </p:sld>
 </file>
 
-<file path=ppt/slides/slide52.xml><?xml version="1.0" encoding="utf-8"?>
+<file path=ppt/slides/slide55.xml><?xml version="1.0" encoding="utf-8"?>
 <p:sld xmlns:a="http://schemas.openxmlformats.org/drawingml/2006/main" xmlns:r="http://schemas.openxmlformats.org/officeDocument/2006/relationships" xmlns:p="http://schemas.openxmlformats.org/presentationml/2006/main">
   <p:cSld>
     <p:spTree>
@@ -19141,7 +20056,7 @@
           <a:p>
             <a:fld id="{856B8CD2-A8B3-41B0-B02C-5B2C28F6DA9C}" type="slidenum">
               <a:rPr lang="ru-RU" smtClean="0"/>
-              <a:t>52</a:t>
+              <a:t>55</a:t>
             </a:fld>
             <a:endParaRPr lang="ru-RU"/>
           </a:p>
@@ -19231,7 +20146,7 @@
 </p:sld>
 </file>
 
-<file path=ppt/slides/slide53.xml><?xml version="1.0" encoding="utf-8"?>
+<file path=ppt/slides/slide56.xml><?xml version="1.0" encoding="utf-8"?>
 <p:sld xmlns:a="http://schemas.openxmlformats.org/drawingml/2006/main" xmlns:r="http://schemas.openxmlformats.org/officeDocument/2006/relationships" xmlns:p="http://schemas.openxmlformats.org/presentationml/2006/main">
   <p:cSld>
     <p:spTree>
@@ -19327,7 +20242,7 @@
           <a:p>
             <a:fld id="{856B8CD2-A8B3-41B0-B02C-5B2C28F6DA9C}" type="slidenum">
               <a:rPr lang="ru-RU" smtClean="0"/>
-              <a:t>53</a:t>
+              <a:t>56</a:t>
             </a:fld>
             <a:endParaRPr lang="ru-RU"/>
           </a:p>
@@ -19353,7 +20268,7 @@
 </p:sld>
 </file>
 
-<file path=ppt/slides/slide54.xml><?xml version="1.0" encoding="utf-8"?>
+<file path=ppt/slides/slide57.xml><?xml version="1.0" encoding="utf-8"?>
 <p:sld xmlns:a="http://schemas.openxmlformats.org/drawingml/2006/main" xmlns:r="http://schemas.openxmlformats.org/officeDocument/2006/relationships" xmlns:p="http://schemas.openxmlformats.org/presentationml/2006/main">
   <p:cSld>
     <p:spTree>
@@ -19418,7 +20333,7 @@
           <a:p>
             <a:fld id="{856B8CD2-A8B3-41B0-B02C-5B2C28F6DA9C}" type="slidenum">
               <a:rPr lang="ru-RU" smtClean="0"/>
-              <a:t>54</a:t>
+              <a:t>57</a:t>
             </a:fld>
             <a:endParaRPr lang="ru-RU"/>
           </a:p>
@@ -19508,7 +20423,7 @@
 </p:sld>
 </file>
 
-<file path=ppt/slides/slide55.xml><?xml version="1.0" encoding="utf-8"?>
+<file path=ppt/slides/slide58.xml><?xml version="1.0" encoding="utf-8"?>
 <p:sld xmlns:a="http://schemas.openxmlformats.org/drawingml/2006/main" xmlns:r="http://schemas.openxmlformats.org/officeDocument/2006/relationships" xmlns:p="http://schemas.openxmlformats.org/presentationml/2006/main">
   <p:cSld>
     <p:spTree>
@@ -19565,7 +20480,7 @@
           <a:p>
             <a:fld id="{856B8CD2-A8B3-41B0-B02C-5B2C28F6DA9C}" type="slidenum">
               <a:rPr lang="ru-RU" smtClean="0"/>
-              <a:t>55</a:t>
+              <a:t>58</a:t>
             </a:fld>
             <a:endParaRPr lang="ru-RU"/>
           </a:p>
@@ -19748,7 +20663,7 @@
 </p:sld>
 </file>
 
-<file path=ppt/slides/slide56.xml><?xml version="1.0" encoding="utf-8"?>
+<file path=ppt/slides/slide59.xml><?xml version="1.0" encoding="utf-8"?>
 <p:sld xmlns:a="http://schemas.openxmlformats.org/drawingml/2006/main" xmlns:r="http://schemas.openxmlformats.org/officeDocument/2006/relationships" xmlns:p="http://schemas.openxmlformats.org/presentationml/2006/main">
   <p:cSld>
     <p:spTree>
@@ -19805,7 +20720,7 @@
           <a:p>
             <a:fld id="{856B8CD2-A8B3-41B0-B02C-5B2C28F6DA9C}" type="slidenum">
               <a:rPr lang="ru-RU" smtClean="0"/>
-              <a:t>56</a:t>
+              <a:t>59</a:t>
             </a:fld>
             <a:endParaRPr lang="ru-RU"/>
           </a:p>
@@ -19992,7 +20907,7 @@
 </p:sld>
 </file>
 
-<file path=ppt/slides/slide57.xml><?xml version="1.0" encoding="utf-8"?>
+<file path=ppt/slides/slide6.xml><?xml version="1.0" encoding="utf-8"?>
 <p:sld xmlns:a="http://schemas.openxmlformats.org/drawingml/2006/main" xmlns:r="http://schemas.openxmlformats.org/officeDocument/2006/relationships" xmlns:p="http://schemas.openxmlformats.org/presentationml/2006/main">
   <p:cSld>
     <p:spTree>
@@ -20025,6 +20940,166 @@
           <a:lstStyle/>
           <a:p>
             <a:r>
+              <a:rPr lang="ru-RU" dirty="0"/>
+              <a:t>Немножко на английском </a:t>
+            </a:r>
+          </a:p>
+        </p:txBody>
+      </p:sp>
+      <p:sp>
+        <p:nvSpPr>
+          <p:cNvPr id="3" name="Объект 2"/>
+          <p:cNvSpPr>
+            <a:spLocks noGrp="1"/>
+          </p:cNvSpPr>
+          <p:nvPr>
+            <p:ph idx="1"/>
+          </p:nvPr>
+        </p:nvSpPr>
+        <p:spPr/>
+        <p:txBody>
+          <a:bodyPr/>
+          <a:lstStyle/>
+          <a:p>
+            <a:pPr marL="0" indent="0">
+              <a:buNone/>
+            </a:pPr>
+            <a:endParaRPr lang="ru-RU" sz="3600" dirty="0" smtClean="0"/>
+          </a:p>
+          <a:p>
+            <a:pPr marL="0" indent="0">
+              <a:buNone/>
+            </a:pPr>
+            <a:r>
+              <a:rPr lang="en-US" sz="3600" b="1" dirty="0" smtClean="0"/>
+              <a:t>Given</a:t>
+            </a:r>
+            <a:r>
+              <a:rPr lang="en-US" sz="3600" dirty="0" smtClean="0"/>
+              <a:t> </a:t>
+            </a:r>
+            <a:r>
+              <a:rPr lang="en-US" sz="3600" i="1" dirty="0"/>
+              <a:t>Masha had 5 apples</a:t>
+            </a:r>
+            <a:endParaRPr lang="ru-RU" sz="3600" i="1" dirty="0"/>
+          </a:p>
+          <a:p>
+            <a:pPr marL="0" indent="0">
+              <a:buNone/>
+            </a:pPr>
+            <a:r>
+              <a:rPr lang="en-US" sz="3600" b="1" dirty="0" smtClean="0"/>
+              <a:t>When</a:t>
+            </a:r>
+            <a:r>
+              <a:rPr lang="en-US" sz="3600" dirty="0" smtClean="0"/>
+              <a:t> </a:t>
+            </a:r>
+            <a:r>
+              <a:rPr lang="en-US" sz="3600" i="1" dirty="0"/>
+              <a:t>Masha gives 2 apples to Sasha</a:t>
+            </a:r>
+            <a:endParaRPr lang="ru-RU" sz="3600" i="1" dirty="0"/>
+          </a:p>
+          <a:p>
+            <a:pPr marL="0" indent="0">
+              <a:buNone/>
+            </a:pPr>
+            <a:r>
+              <a:rPr lang="en-US" sz="3600" b="1" dirty="0"/>
+              <a:t>Then</a:t>
+            </a:r>
+            <a:r>
+              <a:rPr lang="en-US" sz="3600" dirty="0"/>
+              <a:t> </a:t>
+            </a:r>
+            <a:r>
+              <a:rPr lang="en-US" sz="3600" i="1" dirty="0"/>
+              <a:t>Masha should have 3 apples</a:t>
+            </a:r>
+            <a:endParaRPr lang="ru-RU" i="1" dirty="0"/>
+          </a:p>
+        </p:txBody>
+      </p:sp>
+      <p:sp>
+        <p:nvSpPr>
+          <p:cNvPr id="4" name="Номер слайда 3"/>
+          <p:cNvSpPr>
+            <a:spLocks noGrp="1"/>
+          </p:cNvSpPr>
+          <p:nvPr>
+            <p:ph type="sldNum" sz="quarter" idx="12"/>
+          </p:nvPr>
+        </p:nvSpPr>
+        <p:spPr/>
+        <p:txBody>
+          <a:bodyPr/>
+          <a:lstStyle/>
+          <a:p>
+            <a:pPr algn="ctr"/>
+            <a:fld id="{856B8CD2-A8B3-41B0-B02C-5B2C28F6DA9C}" type="slidenum">
+              <a:rPr lang="ru-RU" smtClean="0"/>
+              <a:pPr algn="ctr"/>
+              <a:t>6</a:t>
+            </a:fld>
+            <a:endParaRPr lang="ru-RU" dirty="0"/>
+          </a:p>
+        </p:txBody>
+      </p:sp>
+    </p:spTree>
+    <p:extLst>
+      <p:ext uri="{BB962C8B-B14F-4D97-AF65-F5344CB8AC3E}">
+        <p14:creationId xmlns:p14="http://schemas.microsoft.com/office/powerpoint/2010/main" val="1702210188"/>
+      </p:ext>
+    </p:extLst>
+  </p:cSld>
+  <p:clrMapOvr>
+    <a:masterClrMapping/>
+  </p:clrMapOvr>
+  <p:timing>
+    <p:tnLst>
+      <p:par>
+        <p:cTn id="1" dur="indefinite" restart="never" nodeType="tmRoot"/>
+      </p:par>
+    </p:tnLst>
+  </p:timing>
+</p:sld>
+</file>
+
+<file path=ppt/slides/slide60.xml><?xml version="1.0" encoding="utf-8"?>
+<p:sld xmlns:a="http://schemas.openxmlformats.org/drawingml/2006/main" xmlns:r="http://schemas.openxmlformats.org/officeDocument/2006/relationships" xmlns:p="http://schemas.openxmlformats.org/presentationml/2006/main">
+  <p:cSld>
+    <p:spTree>
+      <p:nvGrpSpPr>
+        <p:cNvPr id="1" name=""/>
+        <p:cNvGrpSpPr/>
+        <p:nvPr/>
+      </p:nvGrpSpPr>
+      <p:grpSpPr>
+        <a:xfrm>
+          <a:off x="0" y="0"/>
+          <a:ext cx="0" cy="0"/>
+          <a:chOff x="0" y="0"/>
+          <a:chExt cx="0" cy="0"/>
+        </a:xfrm>
+      </p:grpSpPr>
+      <p:sp>
+        <p:nvSpPr>
+          <p:cNvPr id="2" name="Заголовок 1"/>
+          <p:cNvSpPr>
+            <a:spLocks noGrp="1"/>
+          </p:cNvSpPr>
+          <p:nvPr>
+            <p:ph type="title"/>
+          </p:nvPr>
+        </p:nvSpPr>
+        <p:spPr/>
+        <p:txBody>
+          <a:bodyPr/>
+          <a:lstStyle/>
+          <a:p>
+            <a:r>
               <a:rPr lang="ru-RU" dirty="0" smtClean="0"/>
               <a:t>Поиск элемента в элементе</a:t>
             </a:r>
@@ -20049,7 +21124,7 @@
           <a:p>
             <a:fld id="{856B8CD2-A8B3-41B0-B02C-5B2C28F6DA9C}" type="slidenum">
               <a:rPr lang="ru-RU" smtClean="0"/>
-              <a:t>57</a:t>
+              <a:t>60</a:t>
             </a:fld>
             <a:endParaRPr lang="ru-RU"/>
           </a:p>
@@ -20204,7 +21279,7 @@
 </p:sld>
 </file>
 
-<file path=ppt/slides/slide58.xml><?xml version="1.0" encoding="utf-8"?>
+<file path=ppt/slides/slide61.xml><?xml version="1.0" encoding="utf-8"?>
 <p:sld xmlns:a="http://schemas.openxmlformats.org/drawingml/2006/main" xmlns:r="http://schemas.openxmlformats.org/officeDocument/2006/relationships" xmlns:p="http://schemas.openxmlformats.org/presentationml/2006/main">
   <p:cSld>
     <p:spTree>
@@ -20261,7 +21336,7 @@
           <a:p>
             <a:fld id="{856B8CD2-A8B3-41B0-B02C-5B2C28F6DA9C}" type="slidenum">
               <a:rPr lang="ru-RU" smtClean="0"/>
-              <a:t>58</a:t>
+              <a:t>61</a:t>
             </a:fld>
             <a:endParaRPr lang="ru-RU"/>
           </a:p>
@@ -20351,7 +21426,7 @@
 </p:sld>
 </file>
 
-<file path=ppt/slides/slide59.xml><?xml version="1.0" encoding="utf-8"?>
+<file path=ppt/slides/slide62.xml><?xml version="1.0" encoding="utf-8"?>
 <p:sld xmlns:a="http://schemas.openxmlformats.org/drawingml/2006/main" xmlns:r="http://schemas.openxmlformats.org/officeDocument/2006/relationships" xmlns:p="http://schemas.openxmlformats.org/presentationml/2006/main">
   <p:cSld>
     <p:spTree>
@@ -20408,7 +21483,7 @@
           <a:p>
             <a:fld id="{856B8CD2-A8B3-41B0-B02C-5B2C28F6DA9C}" type="slidenum">
               <a:rPr lang="ru-RU" smtClean="0"/>
-              <a:t>59</a:t>
+              <a:t>62</a:t>
             </a:fld>
             <a:endParaRPr lang="ru-RU"/>
           </a:p>
@@ -20498,7 +21573,7 @@
 </p:sld>
 </file>
 
-<file path=ppt/slides/slide6.xml><?xml version="1.0" encoding="utf-8"?>
+<file path=ppt/slides/slide63.xml><?xml version="1.0" encoding="utf-8"?>
 <p:sld xmlns:a="http://schemas.openxmlformats.org/drawingml/2006/main" xmlns:r="http://schemas.openxmlformats.org/officeDocument/2006/relationships" xmlns:p="http://schemas.openxmlformats.org/presentationml/2006/main">
   <p:cSld>
     <p:spTree>
@@ -20527,166 +21602,6 @@
         </p:nvSpPr>
         <p:spPr/>
         <p:txBody>
-          <a:bodyPr/>
-          <a:lstStyle/>
-          <a:p>
-            <a:r>
-              <a:rPr lang="ru-RU" dirty="0"/>
-              <a:t>Немножко на английском </a:t>
-            </a:r>
-          </a:p>
-        </p:txBody>
-      </p:sp>
-      <p:sp>
-        <p:nvSpPr>
-          <p:cNvPr id="3" name="Объект 2"/>
-          <p:cNvSpPr>
-            <a:spLocks noGrp="1"/>
-          </p:cNvSpPr>
-          <p:nvPr>
-            <p:ph idx="1"/>
-          </p:nvPr>
-        </p:nvSpPr>
-        <p:spPr/>
-        <p:txBody>
-          <a:bodyPr/>
-          <a:lstStyle/>
-          <a:p>
-            <a:pPr marL="0" indent="0">
-              <a:buNone/>
-            </a:pPr>
-            <a:endParaRPr lang="ru-RU" sz="3600" dirty="0" smtClean="0"/>
-          </a:p>
-          <a:p>
-            <a:pPr marL="0" indent="0">
-              <a:buNone/>
-            </a:pPr>
-            <a:r>
-              <a:rPr lang="en-US" sz="3600" b="1" dirty="0" smtClean="0"/>
-              <a:t>Given</a:t>
-            </a:r>
-            <a:r>
-              <a:rPr lang="en-US" sz="3600" dirty="0" smtClean="0"/>
-              <a:t> </a:t>
-            </a:r>
-            <a:r>
-              <a:rPr lang="en-US" sz="3600" i="1" dirty="0"/>
-              <a:t>Masha had 5 apples</a:t>
-            </a:r>
-            <a:endParaRPr lang="ru-RU" sz="3600" i="1" dirty="0"/>
-          </a:p>
-          <a:p>
-            <a:pPr marL="0" indent="0">
-              <a:buNone/>
-            </a:pPr>
-            <a:r>
-              <a:rPr lang="en-US" sz="3600" b="1" dirty="0" smtClean="0"/>
-              <a:t>When</a:t>
-            </a:r>
-            <a:r>
-              <a:rPr lang="en-US" sz="3600" dirty="0" smtClean="0"/>
-              <a:t> </a:t>
-            </a:r>
-            <a:r>
-              <a:rPr lang="en-US" sz="3600" i="1" dirty="0"/>
-              <a:t>Masha gives 2 apples to Sasha</a:t>
-            </a:r>
-            <a:endParaRPr lang="ru-RU" sz="3600" i="1" dirty="0"/>
-          </a:p>
-          <a:p>
-            <a:pPr marL="0" indent="0">
-              <a:buNone/>
-            </a:pPr>
-            <a:r>
-              <a:rPr lang="en-US" sz="3600" b="1" dirty="0"/>
-              <a:t>Then</a:t>
-            </a:r>
-            <a:r>
-              <a:rPr lang="en-US" sz="3600" dirty="0"/>
-              <a:t> </a:t>
-            </a:r>
-            <a:r>
-              <a:rPr lang="en-US" sz="3600" i="1" dirty="0"/>
-              <a:t>Masha should have 3 apples</a:t>
-            </a:r>
-            <a:endParaRPr lang="ru-RU" i="1" dirty="0"/>
-          </a:p>
-        </p:txBody>
-      </p:sp>
-      <p:sp>
-        <p:nvSpPr>
-          <p:cNvPr id="4" name="Номер слайда 3"/>
-          <p:cNvSpPr>
-            <a:spLocks noGrp="1"/>
-          </p:cNvSpPr>
-          <p:nvPr>
-            <p:ph type="sldNum" sz="quarter" idx="12"/>
-          </p:nvPr>
-        </p:nvSpPr>
-        <p:spPr/>
-        <p:txBody>
-          <a:bodyPr/>
-          <a:lstStyle/>
-          <a:p>
-            <a:pPr algn="ctr"/>
-            <a:fld id="{856B8CD2-A8B3-41B0-B02C-5B2C28F6DA9C}" type="slidenum">
-              <a:rPr lang="ru-RU" smtClean="0"/>
-              <a:pPr algn="ctr"/>
-              <a:t>6</a:t>
-            </a:fld>
-            <a:endParaRPr lang="ru-RU" dirty="0"/>
-          </a:p>
-        </p:txBody>
-      </p:sp>
-    </p:spTree>
-    <p:extLst>
-      <p:ext uri="{BB962C8B-B14F-4D97-AF65-F5344CB8AC3E}">
-        <p14:creationId xmlns:p14="http://schemas.microsoft.com/office/powerpoint/2010/main" val="1702210188"/>
-      </p:ext>
-    </p:extLst>
-  </p:cSld>
-  <p:clrMapOvr>
-    <a:masterClrMapping/>
-  </p:clrMapOvr>
-  <p:timing>
-    <p:tnLst>
-      <p:par>
-        <p:cTn id="1" dur="indefinite" restart="never" nodeType="tmRoot"/>
-      </p:par>
-    </p:tnLst>
-  </p:timing>
-</p:sld>
-</file>
-
-<file path=ppt/slides/slide60.xml><?xml version="1.0" encoding="utf-8"?>
-<p:sld xmlns:a="http://schemas.openxmlformats.org/drawingml/2006/main" xmlns:r="http://schemas.openxmlformats.org/officeDocument/2006/relationships" xmlns:p="http://schemas.openxmlformats.org/presentationml/2006/main">
-  <p:cSld>
-    <p:spTree>
-      <p:nvGrpSpPr>
-        <p:cNvPr id="1" name=""/>
-        <p:cNvGrpSpPr/>
-        <p:nvPr/>
-      </p:nvGrpSpPr>
-      <p:grpSpPr>
-        <a:xfrm>
-          <a:off x="0" y="0"/>
-          <a:ext cx="0" cy="0"/>
-          <a:chOff x="0" y="0"/>
-          <a:chExt cx="0" cy="0"/>
-        </a:xfrm>
-      </p:grpSpPr>
-      <p:sp>
-        <p:nvSpPr>
-          <p:cNvPr id="2" name="Заголовок 1"/>
-          <p:cNvSpPr>
-            <a:spLocks noGrp="1"/>
-          </p:cNvSpPr>
-          <p:nvPr>
-            <p:ph type="title"/>
-          </p:nvPr>
-        </p:nvSpPr>
-        <p:spPr/>
-        <p:txBody>
           <a:bodyPr>
             <a:normAutofit fontScale="90000"/>
           </a:bodyPr>
@@ -20721,7 +21636,7 @@
           <a:p>
             <a:fld id="{856B8CD2-A8B3-41B0-B02C-5B2C28F6DA9C}" type="slidenum">
               <a:rPr lang="ru-RU" smtClean="0"/>
-              <a:t>60</a:t>
+              <a:t>63</a:t>
             </a:fld>
             <a:endParaRPr lang="ru-RU"/>
           </a:p>

</xml_diff>